<commit_message>
FInish presentation from class
</commit_message>
<xml_diff>
--- a/OS_Presentation.pptx
+++ b/OS_Presentation.pptx
@@ -132,6 +132,22 @@
       </a:defRPr>
     </a:lvl9pPr>
   </p:defaultTextStyle>
+  <p:extLst>
+    <p:ext uri="{EFAFB233-063F-42B5-8137-9DF3F51BA10A}">
+      <p15:sldGuideLst xmlns:p15="http://schemas.microsoft.com/office/powerpoint/2012/main">
+        <p15:guide id="1" orient="horz" pos="2160">
+          <p15:clr>
+            <a:srgbClr val="A4A3A4"/>
+          </p15:clr>
+        </p15:guide>
+        <p15:guide id="2" pos="2880">
+          <p15:clr>
+            <a:srgbClr val="A4A3A4"/>
+          </p15:clr>
+        </p15:guide>
+      </p15:sldGuideLst>
+    </p:ext>
+  </p:extLst>
 </p:presentation>
 </file>
 
@@ -223,7 +239,7 @@
           <a:p>
             <a:fld id="{086CB044-4603-384B-A982-A8157D8E567B}" type="datetimeFigureOut">
               <a:rPr lang="en-US" smtClean="0"/>
-              <a:t>4/30/19</a:t>
+              <a:t>4/30/2019</a:t>
             </a:fld>
             <a:endParaRPr lang="en-US"/>
           </a:p>
@@ -389,7 +405,7 @@
           <a:p>
             <a:fld id="{1F17F277-F532-D841-ABF9-9F04C7B64099}" type="datetimeFigureOut">
               <a:rPr lang="en-US" smtClean="0"/>
-              <a:t>4/30/19</a:t>
+              <a:t>4/30/2019</a:t>
             </a:fld>
             <a:endParaRPr lang="en-US"/>
           </a:p>
@@ -453,38 +469,37 @@
           <a:p>
             <a:pPr lvl="0"/>
             <a:r>
-              <a:rPr lang="en-US" smtClean="0"/>
+              <a:rPr lang="en-US"/>
               <a:t>Click to edit Master text styles</a:t>
             </a:r>
           </a:p>
           <a:p>
             <a:pPr lvl="1"/>
             <a:r>
-              <a:rPr lang="en-US" smtClean="0"/>
+              <a:rPr lang="en-US"/>
               <a:t>Second level</a:t>
             </a:r>
           </a:p>
           <a:p>
             <a:pPr lvl="2"/>
             <a:r>
-              <a:rPr lang="en-US" smtClean="0"/>
+              <a:rPr lang="en-US"/>
               <a:t>Third level</a:t>
             </a:r>
           </a:p>
           <a:p>
             <a:pPr lvl="3"/>
             <a:r>
-              <a:rPr lang="en-US" smtClean="0"/>
+              <a:rPr lang="en-US"/>
               <a:t>Fourth level</a:t>
             </a:r>
           </a:p>
           <a:p>
             <a:pPr lvl="4"/>
             <a:r>
-              <a:rPr lang="en-US" smtClean="0"/>
+              <a:rPr lang="en-US"/>
               <a:t>Fifth level</a:t>
             </a:r>
-            <a:endParaRPr lang="en-US"/>
           </a:p>
         </p:txBody>
       </p:sp>
@@ -931,10 +946,9 @@
           </a:lstStyle>
           <a:p>
             <a:r>
-              <a:rPr kumimoji="0" lang="en-US" smtClean="0"/>
+              <a:rPr kumimoji="0" lang="en-US"/>
               <a:t>Click to edit Master title style</a:t>
             </a:r>
-            <a:endParaRPr kumimoji="0" lang="en-US"/>
           </a:p>
         </p:txBody>
       </p:sp>
@@ -994,10 +1008,9 @@
           </a:lstStyle>
           <a:p>
             <a:r>
-              <a:rPr kumimoji="0" lang="en-US" smtClean="0"/>
+              <a:rPr kumimoji="0" lang="en-US"/>
               <a:t>Click to edit Master subtitle style</a:t>
             </a:r>
-            <a:endParaRPr kumimoji="0" lang="en-US"/>
           </a:p>
         </p:txBody>
       </p:sp>
@@ -1034,7 +1047,7 @@
             <a:pPr algn="ctr" eaLnBrk="1" latinLnBrk="0" hangingPunct="1"/>
             <a:fld id="{F9887268-5112-8A4D-9669-170619ECB11D}" type="datetime1">
               <a:rPr lang="en-US" smtClean="0"/>
-              <a:t>4/30/19</a:t>
+              <a:t>4/30/2019</a:t>
             </a:fld>
             <a:endParaRPr lang="en-US" sz="2000" dirty="0">
               <a:solidFill>
@@ -1074,7 +1087,7 @@
           <a:p>
             <a:pPr algn="r" eaLnBrk="1" latinLnBrk="0" hangingPunct="1"/>
             <a:r>
-              <a:rPr kumimoji="0" lang="en-US" smtClean="0">
+              <a:rPr kumimoji="0" lang="en-US">
                 <a:solidFill>
                   <a:schemeClr val="tx2"/>
                 </a:solidFill>
@@ -1171,10 +1184,9 @@
           <a:lstStyle/>
           <a:p>
             <a:r>
-              <a:rPr kumimoji="0" lang="en-US" smtClean="0"/>
+              <a:rPr kumimoji="0" lang="en-US"/>
               <a:t>Click to edit Master title style</a:t>
             </a:r>
-            <a:endParaRPr kumimoji="0" lang="en-US"/>
           </a:p>
         </p:txBody>
       </p:sp>
@@ -1195,35 +1207,35 @@
           <a:p>
             <a:pPr lvl="0" eaLnBrk="1" latinLnBrk="0" hangingPunct="1"/>
             <a:r>
-              <a:rPr lang="en-US" smtClean="0"/>
+              <a:rPr lang="en-US"/>
               <a:t>Click to edit Master text styles</a:t>
             </a:r>
           </a:p>
           <a:p>
             <a:pPr lvl="1" eaLnBrk="1" latinLnBrk="0" hangingPunct="1"/>
             <a:r>
-              <a:rPr lang="en-US" smtClean="0"/>
+              <a:rPr lang="en-US"/>
               <a:t>Second level</a:t>
             </a:r>
           </a:p>
           <a:p>
             <a:pPr lvl="2" eaLnBrk="1" latinLnBrk="0" hangingPunct="1"/>
             <a:r>
-              <a:rPr lang="en-US" smtClean="0"/>
+              <a:rPr lang="en-US"/>
               <a:t>Third level</a:t>
             </a:r>
           </a:p>
           <a:p>
             <a:pPr lvl="3" eaLnBrk="1" latinLnBrk="0" hangingPunct="1"/>
             <a:r>
-              <a:rPr lang="en-US" smtClean="0"/>
+              <a:rPr lang="en-US"/>
               <a:t>Fourth level</a:t>
             </a:r>
           </a:p>
           <a:p>
             <a:pPr lvl="4" eaLnBrk="1" latinLnBrk="0" hangingPunct="1"/>
             <a:r>
-              <a:rPr lang="en-US" smtClean="0"/>
+              <a:rPr lang="en-US"/>
               <a:t>Fifth level</a:t>
             </a:r>
             <a:endParaRPr kumimoji="0" lang="en-US"/>
@@ -1248,7 +1260,7 @@
             <a:pPr eaLnBrk="1" latinLnBrk="0" hangingPunct="1"/>
             <a:fld id="{FC7A11DE-66D9-FD4B-BC0F-9C60DE0C216B}" type="datetime1">
               <a:rPr lang="en-US" smtClean="0"/>
-              <a:t>4/30/19</a:t>
+              <a:t>4/30/2019</a:t>
             </a:fld>
             <a:endParaRPr lang="en-US"/>
           </a:p>
@@ -1270,10 +1282,9 @@
           <a:lstStyle/>
           <a:p>
             <a:r>
-              <a:rPr kumimoji="0" lang="en-US" smtClean="0"/>
+              <a:rPr kumimoji="0" lang="en-US"/>
               <a:t>1 M.  Tavallaee,  E.  Bagheri,  W.  Lu,  and  A.  A.  Ghorbani,  “A  detailed analysis  of  the  kdd  cup  99  data  set,”  in 2009  IEEE  Symposium  on Computational Intelligence for Security and Defense Applications , July 2009, pp. 1–6.  </a:t>
             </a:r>
-            <a:endParaRPr kumimoji="0" lang="en-US"/>
           </a:p>
         </p:txBody>
       </p:sp>
@@ -1352,10 +1363,9 @@
           <a:lstStyle/>
           <a:p>
             <a:r>
-              <a:rPr kumimoji="0" lang="en-US" smtClean="0"/>
+              <a:rPr kumimoji="0" lang="en-US"/>
               <a:t>Click to edit Master title style</a:t>
             </a:r>
-            <a:endParaRPr kumimoji="0" lang="en-US"/>
           </a:p>
         </p:txBody>
       </p:sp>
@@ -1381,35 +1391,35 @@
           <a:p>
             <a:pPr lvl="0" eaLnBrk="1" latinLnBrk="0" hangingPunct="1"/>
             <a:r>
-              <a:rPr lang="en-US" smtClean="0"/>
+              <a:rPr lang="en-US"/>
               <a:t>Click to edit Master text styles</a:t>
             </a:r>
           </a:p>
           <a:p>
             <a:pPr lvl="1" eaLnBrk="1" latinLnBrk="0" hangingPunct="1"/>
             <a:r>
-              <a:rPr lang="en-US" smtClean="0"/>
+              <a:rPr lang="en-US"/>
               <a:t>Second level</a:t>
             </a:r>
           </a:p>
           <a:p>
             <a:pPr lvl="2" eaLnBrk="1" latinLnBrk="0" hangingPunct="1"/>
             <a:r>
-              <a:rPr lang="en-US" smtClean="0"/>
+              <a:rPr lang="en-US"/>
               <a:t>Third level</a:t>
             </a:r>
           </a:p>
           <a:p>
             <a:pPr lvl="3" eaLnBrk="1" latinLnBrk="0" hangingPunct="1"/>
             <a:r>
-              <a:rPr lang="en-US" smtClean="0"/>
+              <a:rPr lang="en-US"/>
               <a:t>Fourth level</a:t>
             </a:r>
           </a:p>
           <a:p>
             <a:pPr lvl="4" eaLnBrk="1" latinLnBrk="0" hangingPunct="1"/>
             <a:r>
-              <a:rPr lang="en-US" smtClean="0"/>
+              <a:rPr lang="en-US"/>
               <a:t>Fifth level</a:t>
             </a:r>
             <a:endParaRPr kumimoji="0" lang="en-US"/>
@@ -1439,7 +1449,7 @@
             <a:pPr eaLnBrk="1" latinLnBrk="0" hangingPunct="1"/>
             <a:fld id="{C5EBC06D-7956-1D4E-8E67-50EDB4CF93D5}" type="datetime1">
               <a:rPr lang="en-US" smtClean="0"/>
-              <a:t>4/30/19</a:t>
+              <a:t>4/30/2019</a:t>
             </a:fld>
             <a:endParaRPr lang="en-US" dirty="0"/>
           </a:p>
@@ -1466,7 +1476,7 @@
           <a:lstStyle/>
           <a:p>
             <a:r>
-              <a:rPr kumimoji="0" lang="en-US" smtClean="0"/>
+              <a:rPr kumimoji="0" lang="en-US"/>
               <a:t>1 M.  Tavallaee,  E.  Bagheri,  W.  Lu,  and  A.  A.  Ghorbani,  “A  detailed analysis  of  the  kdd  cup  99  data  set,”  in 2009  IEEE  Symposium  on Computational Intelligence for Security and Defense Applications , July 2009, pp. 1–6.  </a:t>
             </a:r>
             <a:endParaRPr kumimoji="0" lang="en-US" dirty="0"/>
@@ -1683,10 +1693,9 @@
           <a:lstStyle/>
           <a:p>
             <a:r>
-              <a:rPr kumimoji="0" lang="en-US" smtClean="0"/>
+              <a:rPr kumimoji="0" lang="en-US"/>
               <a:t>Click to edit Master title style</a:t>
             </a:r>
-            <a:endParaRPr kumimoji="0" lang="en-US"/>
           </a:p>
         </p:txBody>
       </p:sp>
@@ -1708,7 +1717,7 @@
             <a:pPr eaLnBrk="1" latinLnBrk="0" hangingPunct="1"/>
             <a:fld id="{3721C387-F575-7C4E-8DB8-532A6DD50515}" type="datetime1">
               <a:rPr lang="en-US" smtClean="0"/>
-              <a:t>4/30/19</a:t>
+              <a:t>4/30/2019</a:t>
             </a:fld>
             <a:endParaRPr lang="en-US" dirty="0"/>
           </a:p>
@@ -1730,10 +1739,9 @@
           <a:lstStyle/>
           <a:p>
             <a:r>
-              <a:rPr kumimoji="0" lang="en-US" smtClean="0"/>
+              <a:rPr kumimoji="0" lang="en-US"/>
               <a:t>1 M.  Tavallaee,  E.  Bagheri,  W.  Lu,  and  A.  A.  Ghorbani,  “A  detailed analysis  of  the  kdd  cup  99  data  set,”  in 2009  IEEE  Symposium  on Computational Intelligence for Security and Defense Applications , July 2009, pp. 1–6.  </a:t>
             </a:r>
-            <a:endParaRPr kumimoji="0" lang="en-US"/>
           </a:p>
         </p:txBody>
       </p:sp>
@@ -1795,35 +1803,35 @@
           <a:p>
             <a:pPr lvl="0" eaLnBrk="1" latinLnBrk="0" hangingPunct="1"/>
             <a:r>
-              <a:rPr lang="en-US" smtClean="0"/>
+              <a:rPr lang="en-US"/>
               <a:t>Click to edit Master text styles</a:t>
             </a:r>
           </a:p>
           <a:p>
             <a:pPr lvl="1" eaLnBrk="1" latinLnBrk="0" hangingPunct="1"/>
             <a:r>
-              <a:rPr lang="en-US" smtClean="0"/>
+              <a:rPr lang="en-US"/>
               <a:t>Second level</a:t>
             </a:r>
           </a:p>
           <a:p>
             <a:pPr lvl="2" eaLnBrk="1" latinLnBrk="0" hangingPunct="1"/>
             <a:r>
-              <a:rPr lang="en-US" smtClean="0"/>
+              <a:rPr lang="en-US"/>
               <a:t>Third level</a:t>
             </a:r>
           </a:p>
           <a:p>
             <a:pPr lvl="3" eaLnBrk="1" latinLnBrk="0" hangingPunct="1"/>
             <a:r>
-              <a:rPr lang="en-US" smtClean="0"/>
+              <a:rPr lang="en-US"/>
               <a:t>Fourth level</a:t>
             </a:r>
           </a:p>
           <a:p>
             <a:pPr lvl="4" eaLnBrk="1" latinLnBrk="0" hangingPunct="1"/>
             <a:r>
-              <a:rPr lang="en-US" smtClean="0"/>
+              <a:rPr lang="en-US"/>
               <a:t>Fifth level</a:t>
             </a:r>
             <a:endParaRPr kumimoji="0" lang="en-US"/>
@@ -1931,7 +1939,7 @@
           <a:p>
             <a:pPr lvl="0" eaLnBrk="1" latinLnBrk="0" hangingPunct="1"/>
             <a:r>
-              <a:rPr kumimoji="0" lang="en-US" smtClean="0"/>
+              <a:rPr kumimoji="0" lang="en-US"/>
               <a:t>Click to edit Master text styles</a:t>
             </a:r>
           </a:p>
@@ -2109,10 +2117,9 @@
           </a:lstStyle>
           <a:p>
             <a:r>
-              <a:rPr kumimoji="0" lang="en-US" smtClean="0"/>
+              <a:rPr kumimoji="0" lang="en-US"/>
               <a:t>Click to edit Master title style</a:t>
             </a:r>
-            <a:endParaRPr kumimoji="0" lang="en-US"/>
           </a:p>
         </p:txBody>
       </p:sp>
@@ -2134,7 +2141,7 @@
             <a:pPr eaLnBrk="1" latinLnBrk="0" hangingPunct="1"/>
             <a:fld id="{841C4AAC-5A41-944B-AF75-FCF037491FE2}" type="datetime1">
               <a:rPr lang="en-US" smtClean="0"/>
-              <a:t>4/30/19</a:t>
+              <a:t>4/30/2019</a:t>
             </a:fld>
             <a:endParaRPr lang="en-US"/>
           </a:p>
@@ -2200,10 +2207,9 @@
           <a:lstStyle/>
           <a:p>
             <a:r>
-              <a:rPr kumimoji="0" lang="en-US" smtClean="0"/>
+              <a:rPr kumimoji="0" lang="en-US"/>
               <a:t>1 M.  Tavallaee,  E.  Bagheri,  W.  Lu,  and  A.  A.  Ghorbani,  “A  detailed analysis  of  the  kdd  cup  99  data  set,”  in 2009  IEEE  Symposium  on Computational Intelligence for Security and Defense Applications , July 2009, pp. 1–6.  </a:t>
             </a:r>
-            <a:endParaRPr kumimoji="0" lang="en-US"/>
           </a:p>
         </p:txBody>
       </p:sp>
@@ -2248,10 +2254,9 @@
           <a:lstStyle/>
           <a:p>
             <a:r>
-              <a:rPr kumimoji="0" lang="en-US" smtClean="0"/>
+              <a:rPr kumimoji="0" lang="en-US"/>
               <a:t>Click to edit Master title style</a:t>
             </a:r>
-            <a:endParaRPr kumimoji="0" lang="en-US"/>
           </a:p>
         </p:txBody>
       </p:sp>
@@ -2277,35 +2282,35 @@
           <a:p>
             <a:pPr lvl="0" eaLnBrk="1" latinLnBrk="0" hangingPunct="1"/>
             <a:r>
-              <a:rPr lang="en-US" smtClean="0"/>
+              <a:rPr lang="en-US"/>
               <a:t>Click to edit Master text styles</a:t>
             </a:r>
           </a:p>
           <a:p>
             <a:pPr lvl="1" eaLnBrk="1" latinLnBrk="0" hangingPunct="1"/>
             <a:r>
-              <a:rPr lang="en-US" smtClean="0"/>
+              <a:rPr lang="en-US"/>
               <a:t>Second level</a:t>
             </a:r>
           </a:p>
           <a:p>
             <a:pPr lvl="2" eaLnBrk="1" latinLnBrk="0" hangingPunct="1"/>
             <a:r>
-              <a:rPr lang="en-US" smtClean="0"/>
+              <a:rPr lang="en-US"/>
               <a:t>Third level</a:t>
             </a:r>
           </a:p>
           <a:p>
             <a:pPr lvl="3" eaLnBrk="1" latinLnBrk="0" hangingPunct="1"/>
             <a:r>
-              <a:rPr lang="en-US" smtClean="0"/>
+              <a:rPr lang="en-US"/>
               <a:t>Fourth level</a:t>
             </a:r>
           </a:p>
           <a:p>
             <a:pPr lvl="4" eaLnBrk="1" latinLnBrk="0" hangingPunct="1"/>
             <a:r>
-              <a:rPr lang="en-US" smtClean="0"/>
+              <a:rPr lang="en-US"/>
               <a:t>Fifth level</a:t>
             </a:r>
             <a:endParaRPr kumimoji="0" lang="en-US"/>
@@ -2334,35 +2339,35 @@
           <a:p>
             <a:pPr lvl="0" eaLnBrk="1" latinLnBrk="0" hangingPunct="1"/>
             <a:r>
-              <a:rPr lang="en-US" smtClean="0"/>
+              <a:rPr lang="en-US"/>
               <a:t>Click to edit Master text styles</a:t>
             </a:r>
           </a:p>
           <a:p>
             <a:pPr lvl="1" eaLnBrk="1" latinLnBrk="0" hangingPunct="1"/>
             <a:r>
-              <a:rPr lang="en-US" smtClean="0"/>
+              <a:rPr lang="en-US"/>
               <a:t>Second level</a:t>
             </a:r>
           </a:p>
           <a:p>
             <a:pPr lvl="2" eaLnBrk="1" latinLnBrk="0" hangingPunct="1"/>
             <a:r>
-              <a:rPr lang="en-US" smtClean="0"/>
+              <a:rPr lang="en-US"/>
               <a:t>Third level</a:t>
             </a:r>
           </a:p>
           <a:p>
             <a:pPr lvl="3" eaLnBrk="1" latinLnBrk="0" hangingPunct="1"/>
             <a:r>
-              <a:rPr lang="en-US" smtClean="0"/>
+              <a:rPr lang="en-US"/>
               <a:t>Fourth level</a:t>
             </a:r>
           </a:p>
           <a:p>
             <a:pPr lvl="4" eaLnBrk="1" latinLnBrk="0" hangingPunct="1"/>
             <a:r>
-              <a:rPr lang="en-US" smtClean="0"/>
+              <a:rPr lang="en-US"/>
               <a:t>Fifth level</a:t>
             </a:r>
             <a:endParaRPr kumimoji="0" lang="en-US"/>
@@ -2387,7 +2392,7 @@
             <a:pPr eaLnBrk="1" latinLnBrk="0" hangingPunct="1"/>
             <a:fld id="{9A25F479-8531-F249-B106-A2124EC46552}" type="datetime1">
               <a:rPr lang="en-US" smtClean="0"/>
-              <a:t>4/30/19</a:t>
+              <a:t>4/30/2019</a:t>
             </a:fld>
             <a:endParaRPr lang="en-US"/>
           </a:p>
@@ -2434,10 +2439,9 @@
           <a:lstStyle/>
           <a:p>
             <a:r>
-              <a:rPr kumimoji="0" lang="en-US" smtClean="0"/>
+              <a:rPr kumimoji="0" lang="en-US"/>
               <a:t>1 M.  Tavallaee,  E.  Bagheri,  W.  Lu,  and  A.  A.  Ghorbani,  “A  detailed analysis  of  the  kdd  cup  99  data  set,”  in 2009  IEEE  Symposium  on Computational Intelligence for Security and Defense Applications , July 2009, pp. 1–6.  </a:t>
             </a:r>
-            <a:endParaRPr kumimoji="0" lang="en-US"/>
           </a:p>
         </p:txBody>
       </p:sp>
@@ -2491,10 +2495,9 @@
           </a:lstStyle>
           <a:p>
             <a:r>
-              <a:rPr kumimoji="0" lang="en-US" smtClean="0"/>
+              <a:rPr kumimoji="0" lang="en-US"/>
               <a:t>Click to edit Master title style</a:t>
             </a:r>
-            <a:endParaRPr kumimoji="0" lang="en-US"/>
           </a:p>
         </p:txBody>
       </p:sp>
@@ -2520,35 +2523,35 @@
           <a:p>
             <a:pPr lvl="0" eaLnBrk="1" latinLnBrk="0" hangingPunct="1"/>
             <a:r>
-              <a:rPr lang="en-US" smtClean="0"/>
+              <a:rPr lang="en-US"/>
               <a:t>Click to edit Master text styles</a:t>
             </a:r>
           </a:p>
           <a:p>
             <a:pPr lvl="1" eaLnBrk="1" latinLnBrk="0" hangingPunct="1"/>
             <a:r>
-              <a:rPr lang="en-US" smtClean="0"/>
+              <a:rPr lang="en-US"/>
               <a:t>Second level</a:t>
             </a:r>
           </a:p>
           <a:p>
             <a:pPr lvl="2" eaLnBrk="1" latinLnBrk="0" hangingPunct="1"/>
             <a:r>
-              <a:rPr lang="en-US" smtClean="0"/>
+              <a:rPr lang="en-US"/>
               <a:t>Third level</a:t>
             </a:r>
           </a:p>
           <a:p>
             <a:pPr lvl="3" eaLnBrk="1" latinLnBrk="0" hangingPunct="1"/>
             <a:r>
-              <a:rPr lang="en-US" smtClean="0"/>
+              <a:rPr lang="en-US"/>
               <a:t>Fourth level</a:t>
             </a:r>
           </a:p>
           <a:p>
             <a:pPr lvl="4" eaLnBrk="1" latinLnBrk="0" hangingPunct="1"/>
             <a:r>
-              <a:rPr lang="en-US" smtClean="0"/>
+              <a:rPr lang="en-US"/>
               <a:t>Fifth level</a:t>
             </a:r>
             <a:endParaRPr kumimoji="0" lang="en-US"/>
@@ -2577,35 +2580,35 @@
           <a:p>
             <a:pPr lvl="0" eaLnBrk="1" latinLnBrk="0" hangingPunct="1"/>
             <a:r>
-              <a:rPr lang="en-US" smtClean="0"/>
+              <a:rPr lang="en-US"/>
               <a:t>Click to edit Master text styles</a:t>
             </a:r>
           </a:p>
           <a:p>
             <a:pPr lvl="1" eaLnBrk="1" latinLnBrk="0" hangingPunct="1"/>
             <a:r>
-              <a:rPr lang="en-US" smtClean="0"/>
+              <a:rPr lang="en-US"/>
               <a:t>Second level</a:t>
             </a:r>
           </a:p>
           <a:p>
             <a:pPr lvl="2" eaLnBrk="1" latinLnBrk="0" hangingPunct="1"/>
             <a:r>
-              <a:rPr lang="en-US" smtClean="0"/>
+              <a:rPr lang="en-US"/>
               <a:t>Third level</a:t>
             </a:r>
           </a:p>
           <a:p>
             <a:pPr lvl="3" eaLnBrk="1" latinLnBrk="0" hangingPunct="1"/>
             <a:r>
-              <a:rPr lang="en-US" smtClean="0"/>
+              <a:rPr lang="en-US"/>
               <a:t>Fourth level</a:t>
             </a:r>
           </a:p>
           <a:p>
             <a:pPr lvl="4" eaLnBrk="1" latinLnBrk="0" hangingPunct="1"/>
             <a:r>
-              <a:rPr lang="en-US" smtClean="0"/>
+              <a:rPr lang="en-US"/>
               <a:t>Fifth level</a:t>
             </a:r>
             <a:endParaRPr kumimoji="0" lang="en-US"/>
@@ -2630,7 +2633,7 @@
             <a:pPr eaLnBrk="1" latinLnBrk="0" hangingPunct="1"/>
             <a:fld id="{E1BC9524-FE4B-6440-A408-5825223D1B56}" type="datetime1">
               <a:rPr lang="en-US" smtClean="0"/>
-              <a:t>4/30/19</a:t>
+              <a:t>4/30/2019</a:t>
             </a:fld>
             <a:endParaRPr lang="en-US"/>
           </a:p>
@@ -2677,10 +2680,9 @@
           <a:lstStyle/>
           <a:p>
             <a:r>
-              <a:rPr kumimoji="0" lang="en-US" smtClean="0"/>
+              <a:rPr kumimoji="0" lang="en-US"/>
               <a:t>1 M.  Tavallaee,  E.  Bagheri,  W.  Lu,  and  A.  A.  Ghorbani,  “A  detailed analysis  of  the  kdd  cup  99  data  set,”  in 2009  IEEE  Symposium  on Computational Intelligence for Security and Defense Applications , July 2009, pp. 1–6.  </a:t>
             </a:r>
-            <a:endParaRPr kumimoji="0" lang="en-US"/>
           </a:p>
         </p:txBody>
       </p:sp>
@@ -2719,7 +2721,7 @@
           <a:p>
             <a:pPr lvl="0" eaLnBrk="1" latinLnBrk="0" hangingPunct="1"/>
             <a:r>
-              <a:rPr kumimoji="0" lang="en-US" smtClean="0"/>
+              <a:rPr kumimoji="0" lang="en-US"/>
               <a:t>Click to edit Master text styles</a:t>
             </a:r>
           </a:p>
@@ -2760,7 +2762,7 @@
           <a:p>
             <a:pPr lvl="0" eaLnBrk="1" latinLnBrk="0" hangingPunct="1"/>
             <a:r>
-              <a:rPr kumimoji="0" lang="en-US" smtClean="0"/>
+              <a:rPr kumimoji="0" lang="en-US"/>
               <a:t>Click to edit Master text styles</a:t>
             </a:r>
           </a:p>
@@ -2807,10 +2809,9 @@
           <a:lstStyle/>
           <a:p>
             <a:r>
-              <a:rPr kumimoji="0" lang="en-US" smtClean="0"/>
+              <a:rPr kumimoji="0" lang="en-US"/>
               <a:t>Click to edit Master title style</a:t>
             </a:r>
-            <a:endParaRPr kumimoji="0" lang="en-US"/>
           </a:p>
         </p:txBody>
       </p:sp>
@@ -2832,7 +2833,7 @@
             <a:pPr eaLnBrk="1" latinLnBrk="0" hangingPunct="1"/>
             <a:fld id="{30A3C386-FC04-E343-ABA7-36A9114A5D14}" type="datetime1">
               <a:rPr lang="en-US" smtClean="0"/>
-              <a:t>4/30/19</a:t>
+              <a:t>4/30/2019</a:t>
             </a:fld>
             <a:endParaRPr lang="en-US"/>
           </a:p>
@@ -2854,10 +2855,9 @@
           <a:lstStyle/>
           <a:p>
             <a:r>
-              <a:rPr kumimoji="0" lang="en-US" smtClean="0"/>
+              <a:rPr kumimoji="0" lang="en-US"/>
               <a:t>1 M.  Tavallaee,  E.  Bagheri,  W.  Lu,  and  A.  A.  Ghorbani,  “A  detailed analysis  of  the  kdd  cup  99  data  set,”  in 2009  IEEE  Symposium  on Computational Intelligence for Security and Defense Applications , July 2009, pp. 1–6.  </a:t>
             </a:r>
-            <a:endParaRPr kumimoji="0" lang="en-US"/>
           </a:p>
         </p:txBody>
       </p:sp>
@@ -2940,7 +2940,7 @@
             <a:pPr eaLnBrk="1" latinLnBrk="0" hangingPunct="1"/>
             <a:fld id="{281FEDCE-6462-614D-BE5B-F20427FA0431}" type="datetime1">
               <a:rPr lang="en-US" smtClean="0"/>
-              <a:t>4/30/19</a:t>
+              <a:t>4/30/2019</a:t>
             </a:fld>
             <a:endParaRPr lang="en-US"/>
           </a:p>
@@ -2962,7 +2962,7 @@
           <a:lstStyle/>
           <a:p>
             <a:r>
-              <a:rPr kumimoji="0" lang="en-US" smtClean="0"/>
+              <a:rPr kumimoji="0" lang="en-US"/>
               <a:t>1 M.  Tavallaee,  E.  Bagheri,  W.  Lu,  and  A.  A.  Ghorbani,  “A  detailed analysis  of  the  kdd  cup  99  data  set,”  in 2009  IEEE  Symposium  on Computational Intelligence for Security and Defense Applications , July 2009, pp. 1–6.  </a:t>
             </a:r>
             <a:endParaRPr kumimoji="0" lang="en-US" dirty="0"/>
@@ -3061,10 +3061,9 @@
           </a:lstStyle>
           <a:p>
             <a:r>
-              <a:rPr kumimoji="0" lang="en-US" smtClean="0"/>
+              <a:rPr kumimoji="0" lang="en-US"/>
               <a:t>Click to edit Master title style</a:t>
             </a:r>
-            <a:endParaRPr kumimoji="0" lang="en-US"/>
           </a:p>
         </p:txBody>
       </p:sp>
@@ -3086,7 +3085,7 @@
             <a:pPr eaLnBrk="1" latinLnBrk="0" hangingPunct="1"/>
             <a:fld id="{7F659F46-1263-D740-A496-4F07934AAD0B}" type="datetime1">
               <a:rPr lang="en-US" smtClean="0"/>
-              <a:t>4/30/19</a:t>
+              <a:t>4/30/2019</a:t>
             </a:fld>
             <a:endParaRPr lang="en-US"/>
           </a:p>
@@ -3108,10 +3107,9 @@
           <a:lstStyle/>
           <a:p>
             <a:r>
-              <a:rPr kumimoji="0" lang="en-US" smtClean="0"/>
+              <a:rPr kumimoji="0" lang="en-US"/>
               <a:t>1 M.  Tavallaee,  E.  Bagheri,  W.  Lu,  and  A.  A.  Ghorbani,  “A  detailed analysis  of  the  kdd  cup  99  data  set,”  in 2009  IEEE  Symposium  on Computational Intelligence for Security and Defense Applications , July 2009, pp. 1–6.  </a:t>
             </a:r>
-            <a:endParaRPr kumimoji="0" lang="en-US"/>
           </a:p>
         </p:txBody>
       </p:sp>
@@ -3219,7 +3217,7 @@
           <a:p>
             <a:pPr lvl="0" eaLnBrk="1" latinLnBrk="0" hangingPunct="1"/>
             <a:r>
-              <a:rPr kumimoji="0" lang="en-US" smtClean="0"/>
+              <a:rPr kumimoji="0" lang="en-US"/>
               <a:t>Click to edit Master text styles</a:t>
             </a:r>
           </a:p>
@@ -3247,35 +3245,35 @@
           <a:p>
             <a:pPr lvl="0" eaLnBrk="1" latinLnBrk="0" hangingPunct="1"/>
             <a:r>
-              <a:rPr lang="en-US" smtClean="0"/>
+              <a:rPr lang="en-US"/>
               <a:t>Click to edit Master text styles</a:t>
             </a:r>
           </a:p>
           <a:p>
             <a:pPr lvl="1" eaLnBrk="1" latinLnBrk="0" hangingPunct="1"/>
             <a:r>
-              <a:rPr lang="en-US" smtClean="0"/>
+              <a:rPr lang="en-US"/>
               <a:t>Second level</a:t>
             </a:r>
           </a:p>
           <a:p>
             <a:pPr lvl="2" eaLnBrk="1" latinLnBrk="0" hangingPunct="1"/>
             <a:r>
-              <a:rPr lang="en-US" smtClean="0"/>
+              <a:rPr lang="en-US"/>
               <a:t>Third level</a:t>
             </a:r>
           </a:p>
           <a:p>
             <a:pPr lvl="3" eaLnBrk="1" latinLnBrk="0" hangingPunct="1"/>
             <a:r>
-              <a:rPr lang="en-US" smtClean="0"/>
+              <a:rPr lang="en-US"/>
               <a:t>Fourth level</a:t>
             </a:r>
           </a:p>
           <a:p>
             <a:pPr lvl="4" eaLnBrk="1" latinLnBrk="0" hangingPunct="1"/>
             <a:r>
-              <a:rPr lang="en-US" smtClean="0"/>
+              <a:rPr lang="en-US"/>
               <a:t>Fifth level</a:t>
             </a:r>
             <a:endParaRPr kumimoji="0" lang="en-US"/>
@@ -3360,7 +3358,7 @@
           <a:p>
             <a:pPr lvl="0" eaLnBrk="1" latinLnBrk="0" hangingPunct="1"/>
             <a:r>
-              <a:rPr kumimoji="0" lang="en-US" smtClean="0"/>
+              <a:rPr kumimoji="0" lang="en-US"/>
               <a:t>Click to edit Master text styles</a:t>
             </a:r>
           </a:p>
@@ -3538,10 +3536,9 @@
           </a:lstStyle>
           <a:p>
             <a:r>
-              <a:rPr kumimoji="0" lang="en-US" smtClean="0"/>
+              <a:rPr kumimoji="0" lang="en-US"/>
               <a:t>Click to edit Master title style</a:t>
             </a:r>
-            <a:endParaRPr kumimoji="0" lang="en-US"/>
           </a:p>
         </p:txBody>
       </p:sp>
@@ -3614,7 +3611,7 @@
             <a:pPr eaLnBrk="1" latinLnBrk="0" hangingPunct="1"/>
             <a:fld id="{EDB60DC4-5759-9349-9B4F-571D7D1871B3}" type="datetime1">
               <a:rPr lang="en-US" smtClean="0"/>
-              <a:t>4/30/19</a:t>
+              <a:t>4/30/2019</a:t>
             </a:fld>
             <a:endParaRPr lang="en-US"/>
           </a:p>
@@ -3675,7 +3672,7 @@
           <a:lstStyle/>
           <a:p>
             <a:r>
-              <a:rPr kumimoji="0" lang="en-US" smtClean="0"/>
+              <a:rPr kumimoji="0" lang="en-US"/>
               <a:t>1 M.  Tavallaee,  E.  Bagheri,  W.  Lu,  and  A.  A.  Ghorbani,  “A  detailed analysis  of  the  kdd  cup  99  data  set,”  in 2009  IEEE  Symposium  on Computational Intelligence for Security and Defense Applications , July 2009, pp. 1–6.  </a:t>
             </a:r>
             <a:endParaRPr kumimoji="0" lang="en-US" dirty="0"/>
@@ -3716,7 +3713,7 @@
           </a:lstStyle>
           <a:p>
             <a:r>
-              <a:rPr kumimoji="0" lang="en-US" smtClean="0"/>
+              <a:rPr kumimoji="0" lang="en-US"/>
               <a:t>Drag picture to placeholder or click icon to add</a:t>
             </a:r>
             <a:endParaRPr kumimoji="0" lang="en-US" dirty="0"/>
@@ -3779,10 +3776,9 @@
           <a:lstStyle/>
           <a:p>
             <a:r>
-              <a:rPr kumimoji="0" lang="en-US" smtClean="0"/>
+              <a:rPr kumimoji="0" lang="en-US"/>
               <a:t>Click to edit Master title style</a:t>
             </a:r>
-            <a:endParaRPr kumimoji="0" lang="en-US"/>
           </a:p>
         </p:txBody>
       </p:sp>
@@ -3813,38 +3809,37 @@
           <a:p>
             <a:pPr lvl="0" eaLnBrk="1" latinLnBrk="0" hangingPunct="1"/>
             <a:r>
-              <a:rPr kumimoji="0" lang="en-US" smtClean="0"/>
+              <a:rPr kumimoji="0" lang="en-US"/>
               <a:t>Click to edit Master text styles</a:t>
             </a:r>
           </a:p>
           <a:p>
             <a:pPr lvl="1" eaLnBrk="1" latinLnBrk="0" hangingPunct="1"/>
             <a:r>
-              <a:rPr kumimoji="0" lang="en-US" smtClean="0"/>
+              <a:rPr kumimoji="0" lang="en-US"/>
               <a:t>Second level</a:t>
             </a:r>
           </a:p>
           <a:p>
             <a:pPr lvl="2" eaLnBrk="1" latinLnBrk="0" hangingPunct="1"/>
             <a:r>
-              <a:rPr kumimoji="0" lang="en-US" smtClean="0"/>
+              <a:rPr kumimoji="0" lang="en-US"/>
               <a:t>Third level</a:t>
             </a:r>
           </a:p>
           <a:p>
             <a:pPr lvl="3" eaLnBrk="1" latinLnBrk="0" hangingPunct="1"/>
             <a:r>
-              <a:rPr kumimoji="0" lang="en-US" smtClean="0"/>
+              <a:rPr kumimoji="0" lang="en-US"/>
               <a:t>Fourth level</a:t>
             </a:r>
           </a:p>
           <a:p>
             <a:pPr lvl="4" eaLnBrk="1" latinLnBrk="0" hangingPunct="1"/>
             <a:r>
-              <a:rPr kumimoji="0" lang="en-US" smtClean="0"/>
+              <a:rPr kumimoji="0" lang="en-US"/>
               <a:t>Fifth level</a:t>
             </a:r>
-            <a:endParaRPr kumimoji="0" lang="en-US"/>
           </a:p>
         </p:txBody>
       </p:sp>
@@ -3882,7 +3877,7 @@
             <a:pPr eaLnBrk="1" latinLnBrk="0" hangingPunct="1"/>
             <a:fld id="{430BBF7A-AC59-EB4B-9E5C-BF9EC409C428}" type="datetime1">
               <a:rPr lang="en-US" smtClean="0"/>
-              <a:t>4/30/19</a:t>
+              <a:t>4/30/2019</a:t>
             </a:fld>
             <a:endParaRPr lang="en-US" sz="1400" dirty="0">
               <a:solidFill>
@@ -3925,7 +3920,7 @@
           <a:p>
             <a:pPr algn="r" eaLnBrk="1" latinLnBrk="0" hangingPunct="1"/>
             <a:r>
-              <a:rPr kumimoji="0" lang="en-US" sz="1400" smtClean="0">
+              <a:rPr kumimoji="0" lang="en-US" sz="1400">
                 <a:solidFill>
                   <a:schemeClr val="tx2"/>
                 </a:solidFill>
@@ -4463,10 +4458,9 @@
           <a:lstStyle/>
           <a:p>
             <a:r>
-              <a:rPr lang="en-US" dirty="0" smtClean="0"/>
+              <a:rPr lang="en-US" dirty="0"/>
               <a:t>datasets and network intrusion detection</a:t>
             </a:r>
-            <a:endParaRPr lang="en-US" dirty="0"/>
           </a:p>
         </p:txBody>
       </p:sp>
@@ -4486,19 +4480,11 @@
           <a:lstStyle/>
           <a:p>
             <a:r>
-              <a:rPr lang="en-US" dirty="0" smtClean="0"/>
-              <a:t>Daniel Mesko</a:t>
-            </a:r>
-            <a:r>
-              <a:rPr lang="en-US" dirty="0"/>
-              <a:t> </a:t>
-            </a:r>
-            <a:r>
-              <a:rPr lang="en-US" dirty="0" smtClean="0"/>
-              <a:t>and Andrew </a:t>
-            </a:r>
-            <a:r>
-              <a:rPr lang="en-US" dirty="0" err="1" smtClean="0"/>
+              <a:rPr lang="en-US" dirty="0"/>
+              <a:t>Daniel Mesko and Andrew </a:t>
+            </a:r>
+            <a:r>
+              <a:rPr lang="en-US" dirty="0" err="1"/>
               <a:t>Quijano</a:t>
             </a:r>
             <a:endParaRPr lang="en-US" dirty="0"/>
@@ -4553,10 +4539,9 @@
           <a:lstStyle/>
           <a:p>
             <a:r>
-              <a:rPr lang="en-US" dirty="0" smtClean="0"/>
+              <a:rPr lang="en-US" dirty="0"/>
               <a:t>Some Features/Values Compared</a:t>
             </a:r>
-            <a:endParaRPr lang="en-US" dirty="0"/>
           </a:p>
         </p:txBody>
       </p:sp>
@@ -4576,22 +4561,21 @@
           <a:lstStyle/>
           <a:p>
             <a:r>
-              <a:rPr lang="en-US" dirty="0" smtClean="0"/>
+              <a:rPr lang="en-US" dirty="0"/>
               <a:t>Protocol, Status Flag, and Land features</a:t>
             </a:r>
           </a:p>
           <a:p>
             <a:r>
-              <a:rPr lang="en-US" dirty="0" smtClean="0"/>
+              <a:rPr lang="en-US" dirty="0"/>
               <a:t>Normal vs. Anomalous Behavior</a:t>
             </a:r>
           </a:p>
           <a:p>
             <a:r>
-              <a:rPr lang="en-US" dirty="0" smtClean="0"/>
+              <a:rPr lang="en-US" dirty="0"/>
               <a:t>KDD Cup ‘99 vs. NSL-KDD</a:t>
             </a:r>
-            <a:endParaRPr lang="en-US" dirty="0"/>
           </a:p>
         </p:txBody>
       </p:sp>
@@ -4641,18 +4625,17 @@
           <a:lstStyle/>
           <a:p>
             <a:r>
-              <a:rPr lang="en-US" dirty="0" smtClean="0"/>
+              <a:rPr lang="en-US" dirty="0"/>
               <a:t>KDD Cup </a:t>
             </a:r>
             <a:r>
-              <a:rPr lang="mr-IN" dirty="0" smtClean="0"/>
+              <a:rPr lang="mr-IN" dirty="0"/>
               <a:t>’</a:t>
             </a:r>
             <a:r>
-              <a:rPr lang="en-US" dirty="0" smtClean="0"/>
+              <a:rPr lang="en-US" dirty="0"/>
               <a:t>99 Protocol Distribution</a:t>
             </a:r>
-            <a:endParaRPr lang="en-US" dirty="0"/>
           </a:p>
         </p:txBody>
       </p:sp>
@@ -4732,10 +4715,9 @@
           <a:lstStyle/>
           <a:p>
             <a:r>
-              <a:rPr lang="en-US" dirty="0" smtClean="0"/>
+              <a:rPr lang="en-US" dirty="0"/>
               <a:t>NSL-KDD Protocol Distribution</a:t>
             </a:r>
-            <a:endParaRPr lang="en-US" dirty="0"/>
           </a:p>
         </p:txBody>
       </p:sp>
@@ -4826,13 +4808,8 @@
             </a:r>
             <a:r>
               <a:rPr lang="en-US" dirty="0"/>
-              <a:t>99 </a:t>
-            </a:r>
-            <a:r>
-              <a:rPr lang="en-US" dirty="0" smtClean="0"/>
-              <a:t>Status Flag Distribution</a:t>
-            </a:r>
-            <a:endParaRPr lang="en-US" dirty="0"/>
+              <a:t>99 Status Flag Distribution</a:t>
+            </a:r>
           </a:p>
         </p:txBody>
       </p:sp>
@@ -4912,10 +4889,9 @@
           <a:lstStyle/>
           <a:p>
             <a:r>
-              <a:rPr lang="en-US" dirty="0" smtClean="0"/>
+              <a:rPr lang="en-US" dirty="0"/>
               <a:t>NSL-KDD Status Flag Distribution</a:t>
             </a:r>
-            <a:endParaRPr lang="en-US" dirty="0"/>
           </a:p>
         </p:txBody>
       </p:sp>
@@ -5004,13 +4980,8 @@
             </a:r>
             <a:r>
               <a:rPr lang="en-US" dirty="0"/>
-              <a:t>99 </a:t>
-            </a:r>
-            <a:r>
-              <a:rPr lang="en-US" dirty="0" smtClean="0"/>
-              <a:t>Land Distribution</a:t>
-            </a:r>
-            <a:endParaRPr lang="en-US" dirty="0"/>
+              <a:t>99 Land Distribution</a:t>
+            </a:r>
           </a:p>
         </p:txBody>
       </p:sp>
@@ -5090,10 +5061,9 @@
           <a:lstStyle/>
           <a:p>
             <a:r>
-              <a:rPr lang="en-US" dirty="0" smtClean="0"/>
+              <a:rPr lang="en-US" dirty="0"/>
               <a:t>NSL-KDD Land Distribution</a:t>
             </a:r>
-            <a:endParaRPr lang="en-US" dirty="0"/>
           </a:p>
         </p:txBody>
       </p:sp>
@@ -5173,10 +5143,9 @@
           <a:lstStyle/>
           <a:p>
             <a:r>
-              <a:rPr lang="en-US" dirty="0" smtClean="0"/>
+              <a:rPr lang="en-US" dirty="0"/>
               <a:t>System Design</a:t>
             </a:r>
-            <a:endParaRPr lang="en-US" dirty="0"/>
           </a:p>
         </p:txBody>
       </p:sp>
@@ -5201,7 +5170,7 @@
           <a:lstStyle/>
           <a:p>
             <a:r>
-              <a:rPr lang="en-US" dirty="0" smtClean="0"/>
+              <a:rPr lang="en-US" dirty="0"/>
               <a:t>Four Components</a:t>
             </a:r>
           </a:p>
@@ -5211,7 +5180,7 @@
               <a:buAutoNum type="arabicPeriod"/>
             </a:pPr>
             <a:r>
-              <a:rPr lang="en-US" dirty="0" smtClean="0"/>
+              <a:rPr lang="en-US" dirty="0"/>
               <a:t>Packet Sniffer</a:t>
             </a:r>
           </a:p>
@@ -5221,7 +5190,7 @@
               <a:buAutoNum type="arabicPeriod"/>
             </a:pPr>
             <a:r>
-              <a:rPr lang="en-US" dirty="0" smtClean="0"/>
+              <a:rPr lang="en-US" dirty="0"/>
               <a:t>Data Pre-Processor</a:t>
             </a:r>
           </a:p>
@@ -5231,7 +5200,7 @@
               <a:buAutoNum type="arabicPeriod"/>
             </a:pPr>
             <a:r>
-              <a:rPr lang="en-US" dirty="0" smtClean="0"/>
+              <a:rPr lang="en-US" dirty="0"/>
               <a:t>ML Models</a:t>
             </a:r>
           </a:p>
@@ -5241,11 +5210,11 @@
               <a:buAutoNum type="arabicPeriod"/>
             </a:pPr>
             <a:r>
-              <a:rPr lang="en-US" dirty="0" smtClean="0"/>
+              <a:rPr lang="en-US" dirty="0"/>
               <a:t>Attack </a:t>
             </a:r>
             <a:r>
-              <a:rPr lang="en-US" dirty="0" err="1" smtClean="0"/>
+              <a:rPr lang="en-US" dirty="0" err="1"/>
               <a:t>Fuzzer</a:t>
             </a:r>
             <a:endParaRPr lang="en-US" dirty="0"/>
@@ -5328,10 +5297,9 @@
           <a:lstStyle/>
           <a:p>
             <a:r>
-              <a:rPr lang="en-US" dirty="0" smtClean="0"/>
+              <a:rPr lang="en-US" dirty="0"/>
               <a:t>System Implementation</a:t>
             </a:r>
-            <a:endParaRPr lang="en-US" dirty="0"/>
           </a:p>
         </p:txBody>
       </p:sp>
@@ -5362,27 +5330,26 @@
               <a:buAutoNum type="arabicPeriod"/>
             </a:pPr>
             <a:r>
-              <a:rPr lang="en-US" dirty="0" smtClean="0"/>
+              <a:rPr lang="en-US" dirty="0"/>
               <a:t>Packet Sniffer</a:t>
             </a:r>
+          </a:p>
+          <a:p>
+            <a:pPr lvl="2"/>
+            <a:r>
+              <a:rPr lang="en-US" dirty="0"/>
+              <a:t>Reads raw network data from live interface using Linux command line application </a:t>
+            </a:r>
+            <a:r>
+              <a:rPr lang="en-US" i="1" dirty="0" err="1"/>
+              <a:t>tcpdump</a:t>
+            </a:r>
             <a:endParaRPr lang="en-US" dirty="0"/>
           </a:p>
           <a:p>
             <a:pPr lvl="2"/>
             <a:r>
-              <a:rPr lang="en-US" dirty="0" smtClean="0"/>
-              <a:t>Reads raw network data from live interface using Linux command line application </a:t>
-            </a:r>
-            <a:r>
-              <a:rPr lang="en-US" i="1" dirty="0" err="1" smtClean="0"/>
-              <a:t>tcpdump</a:t>
-            </a:r>
-            <a:endParaRPr lang="en-US" dirty="0" smtClean="0"/>
-          </a:p>
-          <a:p>
-            <a:pPr lvl="2"/>
-            <a:r>
-              <a:rPr lang="en-US" dirty="0" smtClean="0"/>
+              <a:rPr lang="en-US" dirty="0"/>
               <a:t>After reading a pre-defined number of packets, it outputs a Packet Capture (PCAP) File</a:t>
             </a:r>
           </a:p>
@@ -5392,29 +5359,28 @@
               <a:buAutoNum type="arabicPeriod"/>
             </a:pPr>
             <a:r>
-              <a:rPr lang="en-US" dirty="0" smtClean="0"/>
+              <a:rPr lang="en-US" dirty="0"/>
               <a:t>Data Pre-Processor</a:t>
             </a:r>
-            <a:endParaRPr lang="en-US" dirty="0"/>
           </a:p>
           <a:p>
             <a:pPr lvl="2"/>
             <a:r>
-              <a:rPr lang="en-US" dirty="0" smtClean="0"/>
+              <a:rPr lang="en-US" dirty="0"/>
               <a:t>Reads PCAP files and outputs a CSV file of features identical to those of KDD/NSL-KDD datasets.</a:t>
             </a:r>
           </a:p>
           <a:p>
             <a:pPr lvl="2"/>
             <a:r>
-              <a:rPr lang="en-US" dirty="0" smtClean="0"/>
+              <a:rPr lang="en-US" dirty="0"/>
               <a:t>Some features extracted directly from packet headers, some derived from higher-level relationships between connections and time windows.</a:t>
             </a:r>
           </a:p>
           <a:p>
             <a:pPr lvl="2"/>
             <a:r>
-              <a:rPr lang="en-US" dirty="0" smtClean="0"/>
+              <a:rPr lang="en-US" dirty="0"/>
               <a:t>We used the open-source KDD preprocessor written in C++ by a group of researchers at the University of Bergen.</a:t>
             </a:r>
           </a:p>
@@ -5432,11 +5398,10 @@
               <a:rPr lang="en-US" dirty="0"/>
               <a:t>/AI-IDS/kdd99_feature_extractor</a:t>
             </a:r>
-            <a:endParaRPr lang="en-US" dirty="0" smtClean="0"/>
           </a:p>
           <a:p>
             <a:pPr lvl="2"/>
-            <a:endParaRPr lang="en-US" dirty="0" smtClean="0"/>
+            <a:endParaRPr lang="en-US" dirty="0"/>
           </a:p>
         </p:txBody>
       </p:sp>
@@ -5486,10 +5451,9 @@
           <a:lstStyle/>
           <a:p>
             <a:r>
-              <a:rPr lang="en-US" dirty="0" smtClean="0"/>
+              <a:rPr lang="en-US" dirty="0"/>
               <a:t>System Implementation</a:t>
             </a:r>
-            <a:endParaRPr lang="en-US" dirty="0"/>
           </a:p>
         </p:txBody>
       </p:sp>
@@ -5513,46 +5477,49 @@
               <a:buAutoNum type="arabicPeriod" startAt="3"/>
             </a:pPr>
             <a:r>
-              <a:rPr lang="en-US" dirty="0" smtClean="0"/>
+              <a:rPr lang="en-US" dirty="0"/>
               <a:t>Machine Learning Models</a:t>
             </a:r>
           </a:p>
           <a:p>
             <a:pPr lvl="2"/>
             <a:r>
-              <a:rPr lang="en-US" dirty="0" smtClean="0">
+              <a:rPr lang="en-US" dirty="0">
                 <a:solidFill>
                   <a:srgbClr val="FF0000"/>
                 </a:solidFill>
               </a:rPr>
-              <a:t>FILL THIS IN!!!</a:t>
+              <a:t>Currently working: Naïve Bayes, LDA, QDA</a:t>
             </a:r>
           </a:p>
           <a:p>
             <a:pPr lvl="2"/>
             <a:r>
-              <a:rPr lang="en-US" dirty="0" err="1" smtClean="0">
+              <a:rPr lang="en-US" dirty="0">
                 <a:solidFill>
                   <a:srgbClr val="FF0000"/>
                 </a:solidFill>
               </a:rPr>
-              <a:t>asdasd</a:t>
-            </a:r>
-            <a:endParaRPr lang="en-US" dirty="0" smtClean="0">
-              <a:solidFill>
-                <a:srgbClr val="FF0000"/>
-              </a:solidFill>
-            </a:endParaRPr>
+              <a:t>Classifiers to tune: KDD, Decision Tree, Random Forest, SVM, Logistic Regression </a:t>
+            </a:r>
           </a:p>
           <a:p>
             <a:pPr lvl="2"/>
             <a:r>
-              <a:rPr lang="en-US" dirty="0" err="1" smtClean="0">
+              <a:rPr lang="en-US" dirty="0">
                 <a:solidFill>
                   <a:srgbClr val="FF0000"/>
                 </a:solidFill>
               </a:rPr>
-              <a:t>Asdasda</a:t>
+              <a:t>Incremental Learning: Consult Verma for tuning </a:t>
+            </a:r>
+            <a:r>
+              <a:rPr lang="en-US" dirty="0" err="1">
+                <a:solidFill>
+                  <a:srgbClr val="FF0000"/>
+                </a:solidFill>
+              </a:rPr>
+              <a:t>paramters</a:t>
             </a:r>
             <a:endParaRPr lang="en-US" dirty="0">
               <a:solidFill>
@@ -5566,11 +5533,11 @@
               <a:buAutoNum type="arabicPeriod" startAt="3"/>
             </a:pPr>
             <a:r>
-              <a:rPr lang="en-US" dirty="0" smtClean="0"/>
+              <a:rPr lang="en-US" dirty="0"/>
               <a:t>Attack </a:t>
             </a:r>
             <a:r>
-              <a:rPr lang="en-US" dirty="0" err="1" smtClean="0"/>
+              <a:rPr lang="en-US" dirty="0" err="1"/>
               <a:t>Fuzzer</a:t>
             </a:r>
             <a:endParaRPr lang="en-US" dirty="0"/>
@@ -5578,54 +5545,41 @@
           <a:p>
             <a:pPr marL="1143000" lvl="2" indent="-457200"/>
             <a:r>
-              <a:rPr lang="en-US" dirty="0" err="1" smtClean="0">
+              <a:rPr lang="en-US" dirty="0">
                 <a:solidFill>
                   <a:srgbClr val="FF0000"/>
                 </a:solidFill>
               </a:rPr>
-              <a:t>Askdasd</a:t>
-            </a:r>
-            <a:endParaRPr lang="en-US" dirty="0" smtClean="0">
-              <a:solidFill>
-                <a:srgbClr val="FF0000"/>
-              </a:solidFill>
-            </a:endParaRPr>
+              <a:t>Denial of Service </a:t>
+            </a:r>
           </a:p>
           <a:p>
             <a:pPr marL="1143000" lvl="2" indent="-457200"/>
             <a:r>
-              <a:rPr lang="en-US" dirty="0" err="1" smtClean="0">
+              <a:rPr lang="en-US" dirty="0">
                 <a:solidFill>
                   <a:srgbClr val="FF0000"/>
                 </a:solidFill>
               </a:rPr>
-              <a:t>Askdaskd</a:t>
-            </a:r>
-            <a:endParaRPr lang="en-US" dirty="0" smtClean="0">
-              <a:solidFill>
-                <a:srgbClr val="FF0000"/>
-              </a:solidFill>
-            </a:endParaRPr>
+              <a:t>Port Scanning</a:t>
+            </a:r>
           </a:p>
           <a:p>
             <a:pPr marL="1143000" lvl="2" indent="-457200"/>
             <a:r>
-              <a:rPr lang="en-US" dirty="0" err="1" smtClean="0">
+              <a:rPr lang="en-US" dirty="0">
                 <a:solidFill>
                   <a:srgbClr val="FF0000"/>
                 </a:solidFill>
               </a:rPr>
-              <a:t>Askdasdk</a:t>
-            </a:r>
-            <a:endParaRPr lang="en-US" dirty="0" smtClean="0">
-              <a:solidFill>
-                <a:srgbClr val="FF0000"/>
-              </a:solidFill>
-            </a:endParaRPr>
-          </a:p>
-          <a:p>
-            <a:pPr marL="1143000" lvl="2" indent="-457200"/>
-            <a:endParaRPr lang="en-US" dirty="0" smtClean="0"/>
+              <a:t>User to Root and Remote to Root contains mostly outdated attacks so they are ignored.</a:t>
+            </a:r>
+          </a:p>
+          <a:p>
+            <a:pPr marL="685800" lvl="2" indent="0">
+              <a:buNone/>
+            </a:pPr>
+            <a:endParaRPr lang="en-US" dirty="0"/>
           </a:p>
           <a:p>
             <a:pPr lvl="1"/>
@@ -5691,10 +5645,9 @@
           <a:lstStyle/>
           <a:p>
             <a:r>
-              <a:rPr lang="en-US" dirty="0" smtClean="0"/>
+              <a:rPr lang="en-US" dirty="0"/>
               <a:t>Intrusion Detection Systems</a:t>
             </a:r>
-            <a:endParaRPr lang="en-US" dirty="0"/>
           </a:p>
         </p:txBody>
       </p:sp>
@@ -5714,37 +5667,36 @@
           <a:lstStyle/>
           <a:p>
             <a:r>
-              <a:rPr lang="en-US" dirty="0" smtClean="0"/>
+              <a:rPr lang="en-US" dirty="0"/>
               <a:t>Software that monitors a network or system for malicious activity</a:t>
             </a:r>
           </a:p>
           <a:p>
             <a:r>
-              <a:rPr lang="en-US" dirty="0" smtClean="0"/>
+              <a:rPr lang="en-US" dirty="0"/>
               <a:t>Network Intrusion Detection Systems (NIDS):</a:t>
             </a:r>
           </a:p>
           <a:p>
             <a:pPr lvl="1"/>
             <a:r>
-              <a:rPr lang="en-US" dirty="0" smtClean="0"/>
+              <a:rPr lang="en-US" dirty="0"/>
               <a:t>Placed at strategic points within a network to monitor network traffic</a:t>
             </a:r>
           </a:p>
           <a:p>
             <a:pPr lvl="1"/>
             <a:r>
-              <a:rPr lang="en-US" dirty="0" smtClean="0"/>
+              <a:rPr lang="en-US" dirty="0"/>
               <a:t>Identify malicious (or more generally, anomalous) network behavior</a:t>
             </a:r>
           </a:p>
           <a:p>
             <a:pPr lvl="1"/>
             <a:r>
-              <a:rPr lang="en-US" dirty="0" smtClean="0"/>
+              <a:rPr lang="en-US" dirty="0"/>
               <a:t>Flag the anomaly, alert system administrators and/or ignore it</a:t>
             </a:r>
-            <a:endParaRPr lang="en-US" dirty="0"/>
           </a:p>
         </p:txBody>
       </p:sp>
@@ -5794,10 +5746,9 @@
           <a:lstStyle/>
           <a:p>
             <a:r>
-              <a:rPr lang="en-US" dirty="0" smtClean="0"/>
+              <a:rPr lang="en-US" dirty="0"/>
               <a:t>Experimental Setup</a:t>
             </a:r>
-            <a:endParaRPr lang="en-US" dirty="0"/>
           </a:p>
         </p:txBody>
       </p:sp>
@@ -5819,7 +5770,7 @@
           <a:lstStyle/>
           <a:p>
             <a:r>
-              <a:rPr lang="en-US" dirty="0" smtClean="0"/>
+              <a:rPr lang="en-US" dirty="0"/>
               <a:t>On a Google Cloud VM:</a:t>
             </a:r>
           </a:p>
@@ -5829,7 +5780,7 @@
               <a:buAutoNum type="arabicPeriod"/>
             </a:pPr>
             <a:r>
-              <a:rPr lang="en-US" dirty="0" smtClean="0"/>
+              <a:rPr lang="en-US" dirty="0"/>
               <a:t>IDS trained from the datasets (stored locally).</a:t>
             </a:r>
           </a:p>
@@ -5840,33 +5791,24 @@
             </a:pPr>
             <a:r>
               <a:rPr lang="en-US" i="1" dirty="0" err="1"/>
-              <a:t>t</a:t>
-            </a:r>
-            <a:r>
-              <a:rPr lang="en-US" i="1" dirty="0" err="1" smtClean="0"/>
-              <a:t>cpdump</a:t>
-            </a:r>
-            <a:r>
-              <a:rPr lang="en-US" dirty="0" smtClean="0"/>
+              <a:t>tcpdump</a:t>
+            </a:r>
+            <a:r>
+              <a:rPr lang="en-US" dirty="0"/>
               <a:t> reads from network interface while we:</a:t>
             </a:r>
-            <a:endParaRPr lang="en-US" dirty="0"/>
           </a:p>
           <a:p>
             <a:pPr marL="1611630" lvl="3" indent="-514350"/>
             <a:r>
               <a:rPr lang="en-US" dirty="0"/>
-              <a:t>B</a:t>
-            </a:r>
-            <a:r>
-              <a:rPr lang="en-US" dirty="0" smtClean="0"/>
-              <a:t>rowse the web</a:t>
+              <a:t>Browse the web</a:t>
             </a:r>
           </a:p>
           <a:p>
             <a:pPr marL="1611630" lvl="3" indent="-514350"/>
             <a:r>
-              <a:rPr lang="en-US" dirty="0" smtClean="0"/>
+              <a:rPr lang="en-US" dirty="0"/>
               <a:t>Execute attacks</a:t>
             </a:r>
           </a:p>
@@ -5876,7 +5818,7 @@
               <a:buAutoNum type="arabicPeriod"/>
             </a:pPr>
             <a:r>
-              <a:rPr lang="en-US" dirty="0" smtClean="0"/>
+              <a:rPr lang="en-US" dirty="0"/>
               <a:t>Data pre-processor analyzes traffic, generates CSV file, passes it to the IDS</a:t>
             </a:r>
           </a:p>
@@ -5886,7 +5828,7 @@
               <a:buAutoNum type="arabicPeriod"/>
             </a:pPr>
             <a:r>
-              <a:rPr lang="en-US" dirty="0" smtClean="0"/>
+              <a:rPr lang="en-US" dirty="0"/>
               <a:t>IDS tests CSV file against machine learning models, prints testing score, classification report, and confusion matrix.</a:t>
             </a:r>
           </a:p>
@@ -5938,10 +5880,9 @@
           <a:lstStyle/>
           <a:p>
             <a:r>
-              <a:rPr lang="en-US" dirty="0" smtClean="0"/>
+              <a:rPr lang="en-US" dirty="0"/>
               <a:t>Performance Evaluation</a:t>
             </a:r>
-            <a:endParaRPr lang="en-US" dirty="0"/>
           </a:p>
         </p:txBody>
       </p:sp>
@@ -5961,28 +5902,125 @@
           <a:lstStyle/>
           <a:p>
             <a:r>
-              <a:rPr lang="en-US" dirty="0" smtClean="0">
+              <a:rPr lang="en-US">
                 <a:solidFill>
                   <a:srgbClr val="FF0000"/>
                 </a:solidFill>
               </a:rPr>
-              <a:t>FILL IN!</a:t>
-            </a:r>
-          </a:p>
-          <a:p>
-            <a:r>
-              <a:rPr lang="en-US" dirty="0" smtClean="0">
+              <a:t>NO ATTACKS. </a:t>
+            </a:r>
+            <a:r>
+              <a:rPr lang="en-US" dirty="0">
                 <a:solidFill>
                   <a:srgbClr val="FF0000"/>
                 </a:solidFill>
               </a:rPr>
-              <a:t>FILL IN!</a:t>
-            </a:r>
-            <a:endParaRPr lang="en-US" dirty="0">
-              <a:solidFill>
-                <a:srgbClr val="FF0000"/>
-              </a:solidFill>
-            </a:endParaRPr>
+              <a:t>Just </a:t>
+            </a:r>
+            <a:r>
+              <a:rPr lang="en-US" dirty="0" err="1">
+                <a:solidFill>
+                  <a:srgbClr val="FF0000"/>
+                </a:solidFill>
+              </a:rPr>
+              <a:t>Youtube</a:t>
+            </a:r>
+            <a:r>
+              <a:rPr lang="en-US" dirty="0">
+                <a:solidFill>
+                  <a:srgbClr val="FF0000"/>
+                </a:solidFill>
+              </a:rPr>
+              <a:t> browsing</a:t>
+            </a:r>
+          </a:p>
+          <a:p>
+            <a:pPr marL="0" indent="0">
+              <a:buNone/>
+            </a:pPr>
+            <a:r>
+              <a:rPr lang="en-US" dirty="0">
+                <a:solidFill>
+                  <a:srgbClr val="FF0000"/>
+                </a:solidFill>
+              </a:rPr>
+              <a:t>Naïve Bayes Train/Test Score: 94%/</a:t>
+            </a:r>
+          </a:p>
+          <a:p>
+            <a:pPr marL="0" indent="0">
+              <a:buNone/>
+            </a:pPr>
+            <a:r>
+              <a:rPr lang="en-US" dirty="0">
+                <a:solidFill>
+                  <a:srgbClr val="FF0000"/>
+                </a:solidFill>
+              </a:rPr>
+              <a:t>QDA Train/Test Score: 98.6%/</a:t>
+            </a:r>
+          </a:p>
+          <a:p>
+            <a:pPr marL="0" indent="0">
+              <a:buNone/>
+            </a:pPr>
+            <a:r>
+              <a:rPr lang="en-US" dirty="0">
+                <a:solidFill>
+                  <a:srgbClr val="FF0000"/>
+                </a:solidFill>
+              </a:rPr>
+              <a:t>LDA Train/Test Score: 98.7%/</a:t>
+            </a:r>
+          </a:p>
+          <a:p>
+            <a:r>
+              <a:rPr lang="en-US" dirty="0">
+                <a:solidFill>
+                  <a:srgbClr val="FF0000"/>
+                </a:solidFill>
+              </a:rPr>
+              <a:t>SYN FLOOD</a:t>
+            </a:r>
+          </a:p>
+          <a:p>
+            <a:pPr marL="0" indent="0">
+              <a:buNone/>
+            </a:pPr>
+            <a:r>
+              <a:rPr lang="en-US" dirty="0">
+                <a:solidFill>
+                  <a:srgbClr val="FF0000"/>
+                </a:solidFill>
+              </a:rPr>
+              <a:t>Naïve Bayes Test Score:</a:t>
+            </a:r>
+          </a:p>
+          <a:p>
+            <a:pPr marL="0" indent="0">
+              <a:buNone/>
+            </a:pPr>
+            <a:r>
+              <a:rPr lang="en-US" dirty="0">
+                <a:solidFill>
+                  <a:srgbClr val="FF0000"/>
+                </a:solidFill>
+              </a:rPr>
+              <a:t>QDA Test Score:</a:t>
+            </a:r>
+          </a:p>
+          <a:p>
+            <a:pPr marL="0" indent="0">
+              <a:buNone/>
+            </a:pPr>
+            <a:r>
+              <a:rPr lang="en-US" dirty="0">
+                <a:solidFill>
+                  <a:srgbClr val="FF0000"/>
+                </a:solidFill>
+              </a:rPr>
+              <a:t>LDA Test Score:</a:t>
+            </a:r>
           </a:p>
         </p:txBody>
       </p:sp>
@@ -6032,10 +6070,9 @@
           <a:lstStyle/>
           <a:p>
             <a:r>
-              <a:rPr lang="en-US" dirty="0" smtClean="0"/>
+              <a:rPr lang="en-US" dirty="0"/>
               <a:t>Conclusions</a:t>
             </a:r>
-            <a:endParaRPr lang="en-US" dirty="0"/>
           </a:p>
         </p:txBody>
       </p:sp>
@@ -6055,28 +6092,33 @@
           <a:lstStyle/>
           <a:p>
             <a:r>
-              <a:rPr lang="en-US" dirty="0" smtClean="0">
+              <a:rPr lang="en-US" dirty="0">
                 <a:solidFill>
                   <a:srgbClr val="FF0000"/>
                 </a:solidFill>
               </a:rPr>
-              <a:t>FILL THIS IN?</a:t>
-            </a:r>
-          </a:p>
-          <a:p>
-            <a:r>
-              <a:rPr lang="en-US" dirty="0" smtClean="0">
+              <a:t>Determine whether error is from lack of tuning (need more time for computation) or perhaps the models are too old for modern traffic</a:t>
+            </a:r>
+          </a:p>
+          <a:p>
+            <a:r>
+              <a:rPr lang="en-US" dirty="0">
                 <a:solidFill>
                   <a:srgbClr val="FF0000"/>
                 </a:solidFill>
               </a:rPr>
-              <a:t>Fill this in??</a:t>
-            </a:r>
-            <a:endParaRPr lang="en-US" dirty="0">
-              <a:solidFill>
-                <a:srgbClr val="FF0000"/>
-              </a:solidFill>
-            </a:endParaRPr>
+              <a:t>Test the Adversarial ML model. Determine how to modify attacks such that different pre-processing results are achieved.</a:t>
+            </a:r>
+          </a:p>
+          <a:p>
+            <a:r>
+              <a:rPr lang="en-US" dirty="0">
+                <a:solidFill>
+                  <a:srgbClr val="FF0000"/>
+                </a:solidFill>
+              </a:rPr>
+              <a:t>Attempt to defeat Adversarial ML by changing the time frame from 2 second to another value.</a:t>
+            </a:r>
           </a:p>
         </p:txBody>
       </p:sp>
@@ -6126,10 +6168,9 @@
           <a:lstStyle/>
           <a:p>
             <a:r>
-              <a:rPr lang="en-US" dirty="0" smtClean="0"/>
+              <a:rPr lang="en-US" dirty="0"/>
               <a:t>Future Work/Extensions</a:t>
             </a:r>
-            <a:endParaRPr lang="en-US" dirty="0"/>
           </a:p>
         </p:txBody>
       </p:sp>
@@ -6149,13 +6190,13 @@
           <a:lstStyle/>
           <a:p>
             <a:r>
-              <a:rPr lang="en-US" dirty="0" smtClean="0"/>
+              <a:rPr lang="en-US" dirty="0"/>
               <a:t>Build/find pre-processors for non-KDD-based datasets, so that they can be evaluated against KDD</a:t>
             </a:r>
           </a:p>
           <a:p>
             <a:r>
-              <a:rPr lang="en-US" dirty="0" smtClean="0"/>
+              <a:rPr lang="en-US" dirty="0"/>
               <a:t>Further attempt to doctor packets to subvert IDS, </a:t>
             </a:r>
           </a:p>
@@ -6163,17 +6204,13 @@
             <a:pPr lvl="1"/>
             <a:r>
               <a:rPr lang="en-US" dirty="0"/>
-              <a:t>I</a:t>
-            </a:r>
-            <a:r>
-              <a:rPr lang="en-US" dirty="0" smtClean="0"/>
-              <a:t>dentify weaknesses in certain datasets</a:t>
+              <a:t>Identify weaknesses in certain datasets</a:t>
             </a:r>
           </a:p>
           <a:p>
             <a:pPr lvl="1"/>
             <a:r>
-              <a:rPr lang="en-US" dirty="0" smtClean="0"/>
+              <a:rPr lang="en-US" dirty="0"/>
               <a:t>Make our own dataset with relevant features that can detect these kinds of attacks</a:t>
             </a:r>
           </a:p>
@@ -6229,10 +6266,9 @@
           <a:lstStyle/>
           <a:p>
             <a:r>
-              <a:rPr lang="en-US" dirty="0" smtClean="0"/>
+              <a:rPr lang="en-US" dirty="0"/>
               <a:t>Intrusion Detection Systems</a:t>
             </a:r>
-            <a:endParaRPr lang="en-US" dirty="0"/>
           </a:p>
         </p:txBody>
       </p:sp>
@@ -6252,29 +6288,29 @@
           <a:lstStyle/>
           <a:p>
             <a:r>
-              <a:rPr lang="en-US" dirty="0" smtClean="0"/>
+              <a:rPr lang="en-US" dirty="0"/>
               <a:t>Two Detection Methods:</a:t>
             </a:r>
           </a:p>
           <a:p>
             <a:pPr lvl="1"/>
             <a:r>
-              <a:rPr lang="en-US" b="1" dirty="0" smtClean="0"/>
+              <a:rPr lang="en-US" b="1" dirty="0"/>
               <a:t>Signature-based</a:t>
             </a:r>
             <a:r>
-              <a:rPr lang="en-US" dirty="0" smtClean="0"/>
+              <a:rPr lang="en-US" dirty="0"/>
               <a:t>: specific patterns (called signatures) are pre-identified as malicious; all network traffic is cross-checked with these patterns to identify attacks</a:t>
             </a:r>
           </a:p>
           <a:p>
             <a:pPr lvl="1"/>
             <a:r>
-              <a:rPr lang="en-US" b="1" dirty="0" smtClean="0"/>
+              <a:rPr lang="en-US" b="1" dirty="0"/>
               <a:t>Anomaly-based: </a:t>
             </a:r>
             <a:r>
-              <a:rPr lang="en-US" dirty="0" smtClean="0"/>
+              <a:rPr lang="en-US" dirty="0"/>
               <a:t>taught to distinguish normal network traffic from anomalous (malicious) traffic; new network traffic is compared against the model. Designed to detect unknown attacks. Usually using AI/ML</a:t>
             </a:r>
             <a:endParaRPr lang="en-US" b="1" dirty="0"/>
@@ -6327,10 +6363,9 @@
           <a:lstStyle/>
           <a:p>
             <a:r>
-              <a:rPr lang="en-US" dirty="0" smtClean="0"/>
+              <a:rPr lang="en-US" dirty="0"/>
               <a:t>Anomaly-Based NIDS</a:t>
             </a:r>
-            <a:endParaRPr lang="en-US" dirty="0"/>
           </a:p>
         </p:txBody>
       </p:sp>
@@ -6357,51 +6392,51 @@
           <a:lstStyle/>
           <a:p>
             <a:r>
-              <a:rPr lang="en-US" dirty="0" smtClean="0"/>
+              <a:rPr lang="en-US" dirty="0"/>
               <a:t>Training Phase:</a:t>
             </a:r>
           </a:p>
           <a:p>
             <a:pPr lvl="1"/>
             <a:r>
-              <a:rPr lang="en-US" dirty="0" smtClean="0"/>
+              <a:rPr lang="en-US" dirty="0"/>
               <a:t>ML Model(s) trained with datasets derived from real network traffic </a:t>
             </a:r>
             <a:r>
-              <a:rPr lang="mr-IN" dirty="0" smtClean="0"/>
+              <a:rPr lang="mr-IN" dirty="0"/>
               <a:t>–</a:t>
             </a:r>
             <a:r>
-              <a:rPr lang="en-US" dirty="0" smtClean="0"/>
+              <a:rPr lang="en-US" dirty="0"/>
               <a:t> some records labeled “normal”, others labeled with some anomaly (probe, </a:t>
             </a:r>
             <a:r>
-              <a:rPr lang="en-US" dirty="0" err="1" smtClean="0"/>
+              <a:rPr lang="en-US" dirty="0" err="1"/>
               <a:t>smurf</a:t>
             </a:r>
             <a:r>
-              <a:rPr lang="en-US" dirty="0" smtClean="0"/>
+              <a:rPr lang="en-US" dirty="0"/>
               <a:t>, etc.)</a:t>
             </a:r>
           </a:p>
           <a:p>
             <a:pPr lvl="1"/>
             <a:r>
-              <a:rPr lang="en-US" dirty="0" smtClean="0"/>
+              <a:rPr lang="en-US" dirty="0"/>
               <a:t>Datasets (CSV files) contain many records (rows) of data flows/streams or connections</a:t>
             </a:r>
           </a:p>
           <a:p>
             <a:pPr lvl="1"/>
             <a:r>
-              <a:rPr lang="en-US" dirty="0" smtClean="0"/>
+              <a:rPr lang="en-US" dirty="0"/>
               <a:t>Each row represents a connection, each column a feature of that connection.</a:t>
             </a:r>
           </a:p>
           <a:p>
             <a:pPr lvl="1"/>
             <a:r>
-              <a:rPr lang="en-US" dirty="0" smtClean="0"/>
+              <a:rPr lang="en-US" dirty="0"/>
               <a:t>Some features directly extracted from packet headers, others derived over time, relative to other connections, etc.</a:t>
             </a:r>
           </a:p>
@@ -6469,10 +6504,9 @@
           <a:lstStyle/>
           <a:p>
             <a:r>
-              <a:rPr lang="en-US" dirty="0" smtClean="0"/>
+              <a:rPr lang="en-US" dirty="0"/>
               <a:t>The Problem</a:t>
             </a:r>
-            <a:endParaRPr lang="en-US" dirty="0"/>
           </a:p>
         </p:txBody>
       </p:sp>
@@ -6492,33 +6526,33 @@
           <a:lstStyle/>
           <a:p>
             <a:r>
-              <a:rPr lang="en-US" dirty="0" smtClean="0"/>
+              <a:rPr lang="en-US" dirty="0"/>
               <a:t>Datasets must represent normal AND anomalous network traffic accurately and completely.</a:t>
             </a:r>
           </a:p>
           <a:p>
             <a:r>
-              <a:rPr lang="en-US" dirty="0" smtClean="0"/>
+              <a:rPr lang="en-US" dirty="0"/>
               <a:t>False positives, uncaught attacks </a:t>
             </a:r>
             <a:r>
-              <a:rPr lang="mr-IN" dirty="0" smtClean="0"/>
+              <a:rPr lang="mr-IN" dirty="0"/>
               <a:t>–</a:t>
             </a:r>
             <a:r>
-              <a:rPr lang="en-US" dirty="0" smtClean="0"/>
+              <a:rPr lang="en-US" dirty="0"/>
               <a:t> both common.</a:t>
             </a:r>
           </a:p>
           <a:p>
             <a:r>
-              <a:rPr lang="en-US" dirty="0" smtClean="0"/>
+              <a:rPr lang="en-US" dirty="0"/>
               <a:t>Datasets are hard to come by, often very large (high training overhead).</a:t>
             </a:r>
           </a:p>
           <a:p>
             <a:r>
-              <a:rPr lang="en-US" dirty="0" smtClean="0"/>
+              <a:rPr lang="en-US" dirty="0"/>
               <a:t>The features of many datasets are difficult/time consuming to derive, so the derivation process is hard to replicate and slow to execute when reading live from wire</a:t>
             </a:r>
           </a:p>
@@ -6570,10 +6604,9 @@
           <a:lstStyle/>
           <a:p>
             <a:r>
-              <a:rPr lang="en-US" dirty="0" smtClean="0"/>
+              <a:rPr lang="en-US" dirty="0"/>
               <a:t>Motivation</a:t>
             </a:r>
-            <a:endParaRPr lang="en-US" dirty="0"/>
           </a:p>
         </p:txBody>
       </p:sp>
@@ -6595,53 +6628,43 @@
           <a:lstStyle/>
           <a:p>
             <a:r>
-              <a:rPr lang="en-US" dirty="0" smtClean="0"/>
+              <a:rPr lang="en-US" dirty="0"/>
               <a:t>A handful of datasets exist</a:t>
             </a:r>
           </a:p>
           <a:p>
             <a:pPr lvl="1"/>
             <a:r>
-              <a:rPr lang="en-US" dirty="0" smtClean="0"/>
-              <a:t>The industry standard KDD </a:t>
-            </a:r>
-            <a:r>
-              <a:rPr lang="en-US" dirty="0"/>
-              <a:t>Cup 1999 dataset (now 20 years old</a:t>
-            </a:r>
-            <a:r>
-              <a:rPr lang="en-US" dirty="0" smtClean="0"/>
-              <a:t>) </a:t>
-            </a:r>
-            <a:r>
-              <a:rPr lang="mr-IN" dirty="0" smtClean="0"/>
+              <a:rPr lang="en-US" dirty="0"/>
+              <a:t>The industry standard KDD Cup 1999 dataset (now 20 years old) </a:t>
+            </a:r>
+            <a:r>
+              <a:rPr lang="mr-IN" dirty="0"/>
               <a:t>–</a:t>
             </a:r>
             <a:r>
-              <a:rPr lang="en-US" dirty="0" smtClean="0"/>
+              <a:rPr lang="en-US" dirty="0"/>
               <a:t> many IDS researchers feel that it is bloated (many redundant records), and does not represent modern network traffic accurately and does not contain modern attack variants. </a:t>
             </a:r>
-            <a:endParaRPr lang="en-US" dirty="0"/>
           </a:p>
           <a:p>
             <a:pPr lvl="1"/>
             <a:r>
-              <a:rPr lang="en-US" dirty="0" err="1" smtClean="0"/>
+              <a:rPr lang="en-US" dirty="0" err="1"/>
               <a:t>Reparsings</a:t>
             </a:r>
             <a:r>
-              <a:rPr lang="en-US" dirty="0" smtClean="0"/>
+              <a:rPr lang="en-US" dirty="0"/>
               <a:t> of the KDD dataset, most notably NSL-KDD, which removes redundant records to avoid classifier bias, dataset is smaller and thus easier to use for training.</a:t>
             </a:r>
-            <a:endParaRPr lang="en-US" baseline="30000" dirty="0" smtClean="0"/>
+            <a:endParaRPr lang="en-US" baseline="30000" dirty="0"/>
           </a:p>
           <a:p>
             <a:pPr lvl="1"/>
             <a:r>
-              <a:rPr lang="en-US" dirty="0" smtClean="0"/>
+              <a:rPr lang="en-US" dirty="0"/>
               <a:t>Other datasets, with unique features from KDD, representing specialized different attacks. </a:t>
             </a:r>
-            <a:endParaRPr lang="en-US" dirty="0"/>
           </a:p>
         </p:txBody>
       </p:sp>
@@ -6691,10 +6714,9 @@
           <a:lstStyle/>
           <a:p>
             <a:r>
-              <a:rPr lang="en-US" dirty="0" smtClean="0"/>
+              <a:rPr lang="en-US" dirty="0"/>
               <a:t>Related Work</a:t>
             </a:r>
-            <a:endParaRPr lang="en-US" dirty="0"/>
           </a:p>
         </p:txBody>
       </p:sp>
@@ -6721,22 +6743,22 @@
           <a:lstStyle/>
           <a:p>
             <a:r>
-              <a:rPr lang="en-US" dirty="0" smtClean="0"/>
+              <a:rPr lang="en-US" dirty="0"/>
               <a:t>Data Sets:</a:t>
             </a:r>
           </a:p>
           <a:p>
             <a:pPr lvl="1"/>
             <a:r>
-              <a:rPr lang="en-US" dirty="0" smtClean="0"/>
+              <a:rPr lang="en-US" dirty="0"/>
               <a:t>KDD Cup </a:t>
             </a:r>
             <a:r>
-              <a:rPr lang="mr-IN" dirty="0" smtClean="0"/>
+              <a:rPr lang="mr-IN" dirty="0"/>
               <a:t>’</a:t>
             </a:r>
             <a:r>
-              <a:rPr lang="en-US" dirty="0" smtClean="0"/>
+              <a:rPr lang="en-US" dirty="0"/>
               <a:t>99 original “white-papers”</a:t>
             </a:r>
           </a:p>
@@ -6746,7 +6768,6 @@
               <a:rPr lang="en-US" sz="1200" dirty="0"/>
               <a:t>W. Lee, “A data mining framework for constructing features and models for intrusion detection systems,” Ph.D. dissertation, Columbia University, 1999. </a:t>
             </a:r>
-            <a:endParaRPr lang="en-US" sz="1200" dirty="0" smtClean="0"/>
           </a:p>
           <a:p>
             <a:pPr lvl="2"/>
@@ -6778,19 +6799,18 @@
               <a:rPr lang="en-US" sz="1200" dirty="0"/>
               <a:t>,” 1999. </a:t>
             </a:r>
-            <a:endParaRPr lang="en-US" sz="1200" dirty="0" smtClean="0"/>
           </a:p>
           <a:p>
             <a:pPr lvl="1"/>
             <a:r>
-              <a:rPr lang="en-US" dirty="0" smtClean="0"/>
+              <a:rPr lang="en-US" dirty="0"/>
               <a:t>Secondary KDD Cup ‘99 analyses</a:t>
             </a:r>
           </a:p>
           <a:p>
             <a:pPr lvl="2"/>
             <a:r>
-              <a:rPr lang="en-US" dirty="0" smtClean="0"/>
+              <a:rPr lang="en-US" dirty="0"/>
               <a:t>Shortcomings of KDD, description of NSL-KDD</a:t>
             </a:r>
           </a:p>
@@ -6845,7 +6865,7 @@
           <a:p>
             <a:pPr lvl="2"/>
             <a:r>
-              <a:rPr lang="en-US" dirty="0" smtClean="0"/>
+              <a:rPr lang="en-US" dirty="0"/>
               <a:t>Description of KDD features, relevance</a:t>
             </a:r>
           </a:p>
@@ -6903,12 +6923,11 @@
               <a:rPr lang="en-US" sz="1200" dirty="0"/>
               <a:t> 2010. </a:t>
             </a:r>
-            <a:endParaRPr lang="en-US" sz="1200" dirty="0" smtClean="0"/>
           </a:p>
           <a:p>
             <a:pPr lvl="2"/>
             <a:r>
-              <a:rPr lang="en-US" dirty="0" smtClean="0"/>
+              <a:rPr lang="en-US" dirty="0"/>
               <a:t>Relevance of features, proposal of smaller feature sets</a:t>
             </a:r>
           </a:p>
@@ -6942,19 +6961,18 @@
               <a:rPr lang="en-US" sz="1300" dirty="0"/>
               <a:t>, 2014. </a:t>
             </a:r>
-            <a:endParaRPr lang="en-US" sz="1300" dirty="0"/>
           </a:p>
           <a:p>
             <a:pPr lvl="1"/>
             <a:r>
-              <a:rPr lang="en-US" sz="2800" dirty="0" smtClean="0"/>
+              <a:rPr lang="en-US" sz="2800" dirty="0"/>
               <a:t>Feature Derivation, Dataset Evaluation</a:t>
             </a:r>
           </a:p>
           <a:p>
             <a:pPr lvl="2"/>
             <a:r>
-              <a:rPr lang="en-US" sz="2500" dirty="0" smtClean="0"/>
+              <a:rPr lang="en-US" sz="2500" dirty="0"/>
               <a:t>Feature derivation process, IDS testing tools</a:t>
             </a:r>
           </a:p>
@@ -6970,22 +6988,13 @@
             </a:r>
             <a:r>
               <a:rPr lang="en-US" sz="1400" dirty="0"/>
-              <a:t>, “Framework for generating ids benchmarking data sets,” </a:t>
-            </a:r>
-            <a:r>
-              <a:rPr lang="en-US" sz="1400" dirty="0" smtClean="0"/>
-              <a:t>Ph.D</a:t>
-            </a:r>
-            <a:r>
-              <a:rPr lang="en-US" sz="1400" dirty="0"/>
-              <a:t>. dissertation, 2007. </a:t>
-            </a:r>
-            <a:endParaRPr lang="en-US" sz="1400" dirty="0" smtClean="0"/>
+              <a:t>, “Framework for generating ids benchmarking data sets,” Ph.D. dissertation, 2007. </a:t>
+            </a:r>
           </a:p>
           <a:p>
             <a:pPr lvl="2"/>
             <a:r>
-              <a:rPr lang="en-US" sz="2700" dirty="0" smtClean="0"/>
+              <a:rPr lang="en-US" sz="2700" dirty="0"/>
               <a:t>Properties for evaluating datasets</a:t>
             </a:r>
           </a:p>
@@ -7025,17 +7034,8 @@
             </a:r>
             <a:r>
               <a:rPr lang="en-US" sz="1500" dirty="0"/>
-              <a:t>, “A </a:t>
-            </a:r>
-            <a:r>
-              <a:rPr lang="en-US" sz="1500" dirty="0" smtClean="0"/>
-              <a:t>survey </a:t>
-            </a:r>
-            <a:r>
-              <a:rPr lang="en-US" sz="1500" dirty="0"/>
-              <a:t>of network-based intrusion detection data sets,” 2019. </a:t>
-            </a:r>
-            <a:endParaRPr lang="en-US" sz="1500" dirty="0"/>
+              <a:t>, “A survey of network-based intrusion detection data sets,” 2019. </a:t>
+            </a:r>
           </a:p>
           <a:p>
             <a:pPr lvl="3"/>
@@ -7043,7 +7043,7 @@
           </a:p>
           <a:p>
             <a:pPr lvl="3"/>
-            <a:endParaRPr lang="en-US" sz="1300" dirty="0" smtClean="0"/>
+            <a:endParaRPr lang="en-US" sz="1300" dirty="0"/>
           </a:p>
           <a:p>
             <a:pPr lvl="3"/>
@@ -7101,10 +7101,9 @@
           <a:lstStyle/>
           <a:p>
             <a:r>
-              <a:rPr lang="en-US" dirty="0" smtClean="0"/>
+              <a:rPr lang="en-US" dirty="0"/>
               <a:t>Related Work</a:t>
             </a:r>
-            <a:endParaRPr lang="en-US" dirty="0"/>
           </a:p>
         </p:txBody>
       </p:sp>
@@ -7120,69 +7119,122 @@
         </p:nvSpPr>
         <p:spPr/>
         <p:txBody>
-          <a:bodyPr/>
-          <a:lstStyle/>
-          <a:p>
-            <a:r>
-              <a:rPr lang="en-US" dirty="0" smtClean="0"/>
+          <a:bodyPr>
+            <a:normAutofit/>
+          </a:bodyPr>
+          <a:lstStyle/>
+          <a:p>
+            <a:r>
+              <a:rPr lang="en-US" dirty="0"/>
               <a:t>Machine Learning Models</a:t>
             </a:r>
           </a:p>
           <a:p>
             <a:pPr lvl="1"/>
             <a:r>
-              <a:rPr lang="en-US" dirty="0" smtClean="0">
-                <a:solidFill>
-                  <a:srgbClr val="FF0000"/>
-                </a:solidFill>
-              </a:rPr>
-              <a:t>FILL THIS IN!!</a:t>
+              <a:rPr lang="en-US" sz="2400" b="1" dirty="0"/>
+              <a:t>An overview of neural networks use in anomaly Intrusion Detection Systems </a:t>
+            </a:r>
+          </a:p>
+          <a:p>
+            <a:pPr lvl="2"/>
+            <a:r>
+              <a:rPr lang="en-US" sz="1100" dirty="0"/>
+              <a:t>Sani, Y., </a:t>
+            </a:r>
+            <a:r>
+              <a:rPr lang="en-US" sz="1100" dirty="0" err="1"/>
+              <a:t>Mohamedou</a:t>
+            </a:r>
+            <a:r>
+              <a:rPr lang="en-US" sz="1100" dirty="0"/>
+              <a:t>, A., Ali, K., </a:t>
+            </a:r>
+            <a:r>
+              <a:rPr lang="en-US" sz="1100" dirty="0" err="1"/>
+              <a:t>Farjamfar</a:t>
+            </a:r>
+            <a:r>
+              <a:rPr lang="en-US" sz="1100" dirty="0"/>
+              <a:t>, A., Azman, M., &amp; Shamsuddin, S. (2009, November). An overview of neural networks use in anomaly intrusion detection systems. In </a:t>
+            </a:r>
+            <a:r>
+              <a:rPr lang="en-US" sz="1100" i="1" dirty="0"/>
+              <a:t>2009 IEEE Student Conference on Research and Development (</a:t>
+            </a:r>
+            <a:r>
+              <a:rPr lang="en-US" sz="1100" i="1" dirty="0" err="1"/>
+              <a:t>SCOReD</a:t>
+            </a:r>
+            <a:r>
+              <a:rPr lang="en-US" sz="1100" i="1" dirty="0"/>
+              <a:t>)</a:t>
+            </a:r>
+            <a:r>
+              <a:rPr lang="en-US" sz="1100" dirty="0"/>
+              <a:t> (pp. 89-92). IEEE.</a:t>
             </a:r>
           </a:p>
           <a:p>
             <a:pPr lvl="1"/>
             <a:r>
-              <a:rPr lang="en-US" dirty="0" smtClean="0">
-                <a:solidFill>
-                  <a:srgbClr val="FF0000"/>
-                </a:solidFill>
-              </a:rPr>
-              <a:t>FILL THIS IN!</a:t>
+              <a:rPr lang="en-US" sz="2400" b="1" dirty="0"/>
+              <a:t>Intrusion Detection System Using Bayesian Network and Feature Subset Selection </a:t>
+            </a:r>
+          </a:p>
+          <a:p>
+            <a:pPr lvl="2"/>
+            <a:r>
+              <a:rPr lang="en-US" sz="1100" dirty="0"/>
+              <a:t>Jabbar, M. A., </a:t>
+            </a:r>
+            <a:r>
+              <a:rPr lang="en-US" sz="1100" dirty="0" err="1"/>
+              <a:t>Aluvalu</a:t>
+            </a:r>
+            <a:r>
+              <a:rPr lang="en-US" sz="1100" dirty="0"/>
+              <a:t>, R., &amp; Reddy, S. S. S. (2017, December). Intrusion Detection System Using Bayesian Network and Feature Subset Selection. In </a:t>
+            </a:r>
+            <a:r>
+              <a:rPr lang="en-US" sz="1100" i="1" dirty="0"/>
+              <a:t>2017 IEEE International Conference on Computational Intelligence and Computing Research (ICCIC)</a:t>
+            </a:r>
+            <a:r>
+              <a:rPr lang="en-US" sz="1100" dirty="0"/>
+              <a:t> (pp. 1-5). IEEE.</a:t>
             </a:r>
           </a:p>
           <a:p>
             <a:pPr lvl="1"/>
             <a:r>
-              <a:rPr lang="en-US" dirty="0" smtClean="0">
-                <a:solidFill>
-                  <a:srgbClr val="FF0000"/>
-                </a:solidFill>
-              </a:rPr>
-              <a:t>FILL THIS IN!!</a:t>
-            </a:r>
-          </a:p>
-          <a:p>
-            <a:pPr lvl="1"/>
-            <a:r>
-              <a:rPr lang="en-US" dirty="0" smtClean="0">
-                <a:solidFill>
-                  <a:srgbClr val="FF0000"/>
-                </a:solidFill>
-              </a:rPr>
-              <a:t>FILL THIS IN!!</a:t>
-            </a:r>
-          </a:p>
-          <a:p>
-            <a:pPr lvl="1"/>
-            <a:r>
-              <a:rPr lang="en-US" dirty="0" smtClean="0">
-                <a:solidFill>
-                  <a:srgbClr val="FF0000"/>
-                </a:solidFill>
-              </a:rPr>
-              <a:t>LOL</a:t>
-            </a:r>
-            <a:endParaRPr lang="en-US" dirty="0">
+              <a:rPr lang="en-US" sz="2300" b="1" dirty="0"/>
+              <a:t>PHAD: Packet header anomaly detection for identifying hostile network traffic</a:t>
+            </a:r>
+            <a:r>
+              <a:rPr lang="en-US" sz="2300" dirty="0"/>
+              <a:t>. </a:t>
+            </a:r>
+          </a:p>
+          <a:p>
+            <a:pPr lvl="2"/>
+            <a:r>
+              <a:rPr lang="en-US" sz="1100" dirty="0"/>
+              <a:t>Mahoney, M. V., &amp; Chan, P. K. (2001). </a:t>
+            </a:r>
+            <a:r>
+              <a:rPr lang="en-US" sz="1100" i="1" dirty="0"/>
+              <a:t>PHAD: Packet header anomaly detection for identifying hostile network traffic</a:t>
+            </a:r>
+            <a:r>
+              <a:rPr lang="en-US" sz="900" dirty="0"/>
+              <a:t>.</a:t>
+            </a:r>
+            <a:r>
+              <a:rPr lang="en-US" sz="1200" dirty="0"/>
+              <a:t>.</a:t>
+            </a:r>
+            <a:endParaRPr lang="en-US" sz="1200" dirty="0">
               <a:solidFill>
                 <a:srgbClr val="FF0000"/>
               </a:solidFill>
@@ -7236,10 +7288,9 @@
           <a:lstStyle/>
           <a:p>
             <a:r>
-              <a:rPr lang="en-US" dirty="0" smtClean="0"/>
+              <a:rPr lang="en-US" dirty="0"/>
               <a:t>Our Goals</a:t>
             </a:r>
-            <a:endParaRPr lang="en-US" dirty="0"/>
           </a:p>
         </p:txBody>
       </p:sp>
@@ -7266,95 +7317,86 @@
           <a:lstStyle/>
           <a:p>
             <a:r>
-              <a:rPr lang="en-US" dirty="0" smtClean="0"/>
+              <a:rPr lang="en-US" dirty="0"/>
               <a:t>Analyze KDD Cup </a:t>
             </a:r>
             <a:r>
-              <a:rPr lang="mr-IN" dirty="0" smtClean="0"/>
+              <a:rPr lang="mr-IN" dirty="0"/>
               <a:t>’</a:t>
             </a:r>
             <a:r>
-              <a:rPr lang="en-US" dirty="0" smtClean="0"/>
+              <a:rPr lang="en-US" dirty="0"/>
               <a:t>99 dataset</a:t>
             </a:r>
           </a:p>
           <a:p>
             <a:pPr lvl="1"/>
             <a:r>
-              <a:rPr lang="en-US" dirty="0" smtClean="0"/>
+              <a:rPr lang="en-US" dirty="0"/>
               <a:t>Examine the distinct values for each feature in the dataset.</a:t>
             </a:r>
           </a:p>
           <a:p>
             <a:pPr lvl="2"/>
             <a:r>
-              <a:rPr lang="en-US" dirty="0" smtClean="0"/>
+              <a:rPr lang="en-US" dirty="0"/>
               <a:t>Distribution of values across normal v. anomalous behavior.</a:t>
             </a:r>
           </a:p>
           <a:p>
             <a:pPr lvl="2"/>
             <a:r>
-              <a:rPr lang="en-US" dirty="0" smtClean="0"/>
+              <a:rPr lang="en-US" dirty="0"/>
               <a:t>Features with highest variation across normal v. anomalous behavior.</a:t>
             </a:r>
           </a:p>
           <a:p>
             <a:pPr lvl="1"/>
             <a:r>
-              <a:rPr lang="en-US" dirty="0" smtClean="0"/>
+              <a:rPr lang="en-US" dirty="0"/>
               <a:t>Use it to train an IDS, generate our own attacks against the system, observe success/false-positivity rates.</a:t>
             </a:r>
           </a:p>
           <a:p>
             <a:r>
-              <a:rPr lang="en-US" dirty="0" smtClean="0"/>
+              <a:rPr lang="en-US" dirty="0"/>
               <a:t>Analyze NSL-KDD dataset</a:t>
             </a:r>
           </a:p>
           <a:p>
             <a:pPr lvl="1"/>
             <a:r>
-              <a:rPr lang="en-US" dirty="0" smtClean="0"/>
+              <a:rPr lang="en-US" dirty="0"/>
               <a:t>Examine the values for each feature.</a:t>
             </a:r>
           </a:p>
           <a:p>
             <a:pPr lvl="2"/>
             <a:r>
-              <a:rPr lang="en-US" dirty="0" smtClean="0"/>
-              <a:t>Difference in frequencies of values from </a:t>
-            </a:r>
-            <a:r>
-              <a:rPr lang="en-US" dirty="0"/>
-              <a:t>those of KDD Cup </a:t>
-            </a:r>
-            <a:r>
-              <a:rPr lang="mr-IN" dirty="0" smtClean="0"/>
+              <a:rPr lang="en-US" dirty="0"/>
+              <a:t>Difference in frequencies of values from those of KDD Cup </a:t>
+            </a:r>
+            <a:r>
+              <a:rPr lang="mr-IN" dirty="0"/>
               <a:t>’</a:t>
             </a:r>
             <a:r>
-              <a:rPr lang="en-US" dirty="0" smtClean="0"/>
+              <a:rPr lang="en-US" dirty="0"/>
               <a:t>99</a:t>
             </a:r>
           </a:p>
           <a:p>
             <a:pPr lvl="2"/>
             <a:r>
-              <a:rPr lang="en-US" dirty="0" smtClean="0"/>
+              <a:rPr lang="en-US" dirty="0"/>
               <a:t>Ratio of normal to attack records as opposed to KDD Cup ‘00</a:t>
             </a:r>
-            <a:endParaRPr lang="en-US" dirty="0"/>
           </a:p>
           <a:p>
             <a:pPr lvl="1"/>
             <a:r>
-              <a:rPr lang="en-US" dirty="0" smtClean="0"/>
-              <a:t>Use it to train an IDS, generate </a:t>
-            </a:r>
-            <a:r>
-              <a:rPr lang="en-US" dirty="0"/>
-              <a:t>our own attacks against the system, observe success/false-positivity rates.</a:t>
+              <a:rPr lang="en-US" dirty="0"/>
+              <a:t>Use it to train an IDS, generate our own attacks against the system, observe success/false-positivity rates.</a:t>
             </a:r>
           </a:p>
         </p:txBody>

</xml_diff>